<commit_message>
Here is the second presentation draft
</commit_message>
<xml_diff>
--- a/PosterDraft.pptx
+++ b/PosterDraft.pptx
@@ -241,7 +241,7 @@
       <pc:sldMk xmlns:pc="http://schemas.microsoft.com/office/powerpoint/2013/main/command" cId="0" sldId="256"/>
       <ac:spMk id="14346" creationId="{5371A8AC-23E9-ABC6-3A75-80BD1937E966}"/>
       <ac:txMk cp="0" len="5">
-        <ac:context len="169" hash="3386925027"/>
+        <ac:context len="182" hash="2201148301"/>
       </ac:txMk>
     </ac:txMkLst>
     <p188:pos x="1339128" y="793346"/>
@@ -262,7 +262,7 @@
       <pc:sldMk xmlns:pc="http://schemas.microsoft.com/office/powerpoint/2013/main/command" cId="0" sldId="256"/>
       <ac:spMk id="14346" creationId="{5371A8AC-23E9-ABC6-3A75-80BD1937E966}"/>
       <ac:txMk cp="27" len="28">
-        <ac:context len="169" hash="3386925027"/>
+        <ac:context len="182" hash="2201148301"/>
       </ac:txMk>
     </ac:txMkLst>
     <p188:pos x="6596928" y="1275946"/>
@@ -282,8 +282,8 @@
       <pc:docMk xmlns:pc="http://schemas.microsoft.com/office/powerpoint/2013/main/command"/>
       <pc:sldMk xmlns:pc="http://schemas.microsoft.com/office/powerpoint/2013/main/command" cId="0" sldId="256"/>
       <ac:spMk id="24" creationId="{BFE10A64-2DD5-7A17-6C73-6B297FA9B624}"/>
-      <ac:txMk cp="105" len="46">
-        <ac:context len="153" hash="3123386571"/>
+      <ac:txMk cp="244" len="1">
+        <ac:context len="294" hash="610577296"/>
       </ac:txMk>
     </ac:txMkLst>
     <p188:pos x="5382492" y="3530830"/>
@@ -304,8 +304,8 @@
       <pc:docMk xmlns:pc="http://schemas.microsoft.com/office/powerpoint/2013/main/command"/>
       <pc:sldMk xmlns:pc="http://schemas.microsoft.com/office/powerpoint/2013/main/command" cId="0" sldId="256"/>
       <ac:spMk id="24" creationId="{BFE10A64-2DD5-7A17-6C73-6B297FA9B624}"/>
-      <ac:txMk cp="52" len="11">
-        <ac:context len="153" hash="3123386571"/>
+      <ac:txMk cp="46">
+        <ac:context len="294" hash="610577296"/>
       </ac:txMk>
     </ac:txMkLst>
     <p188:pos x="4163292" y="1976350"/>
@@ -317,6 +317,22 @@
           <a:rPr lang="en-US"/>
           <a:t>Dc only, limited time, limited to what was reported.
 muticolinearity</a:t>
+        </a:r>
+      </a:p>
+    </p188:txBody>
+  </p188:cm>
+  <p188:cm id="{90C9BAFD-A8C1-42D2-804F-A00808CC6A6F}" authorId="{59EE3575-1E4C-0FEC-57F5-F069D3C208A0}" created="2023-04-28T21:42:03.140">
+    <pc:sldMkLst xmlns:pc="http://schemas.microsoft.com/office/powerpoint/2013/main/command">
+      <pc:docMk/>
+      <pc:sldMk cId="0" sldId="256"/>
+    </pc:sldMkLst>
+    <p188:txBody>
+      <a:bodyPr/>
+      <a:lstStyle/>
+      <a:p>
+        <a:r>
+          <a:rPr lang="en-US"/>
+          <a:t>Add link to repo</a:t>
         </a:r>
       </a:p>
     </p188:txBody>
@@ -439,7 +455,7 @@
             <a:fld id="{1E44E51C-57D0-6B4C-9C03-A3E12CE0FF75}" type="datetime1">
               <a:rPr lang="en-US" altLang="en-US"/>
               <a:pPr/>
-              <a:t>4/24/2023</a:t>
+              <a:t>4/28/2023</a:t>
             </a:fld>
             <a:endParaRPr lang="en-US" altLang="en-US"/>
           </a:p>
@@ -880,15 +896,216 @@
           </a:extLst>
         </p:spPr>
         <p:txBody>
-          <a:bodyPr/>
+          <a:bodyPr>
+            <a:normAutofit lnSpcReduction="10000"/>
+          </a:bodyPr>
           <a:lstStyle/>
+          <a:p>
+            <a:pPr eaLnBrk="1" hangingPunct="1">
+              <a:spcBef>
+                <a:spcPts val="321"/>
+              </a:spcBef>
+            </a:pPr>
+            <a:r>
+              <a:rPr lang="en-US" altLang="en-US" sz="9600" dirty="0">
+                <a:solidFill>
+                  <a:schemeClr val="bg1"/>
+                </a:solidFill>
+                <a:latin typeface="Calibri" panose="020F0502020204030204" pitchFamily="34" charset="0"/>
+                <a:cs typeface="Calibri" panose="020F0502020204030204" pitchFamily="34" charset="0"/>
+              </a:rPr>
+              <a:t>General Guidance</a:t>
+            </a:r>
+          </a:p>
+          <a:p>
+            <a:pPr marL="457200" indent="-457200" eaLnBrk="1" hangingPunct="1">
+              <a:spcBef>
+                <a:spcPts val="321"/>
+              </a:spcBef>
+              <a:buFont typeface="Arial" panose="020B0604020202020204" pitchFamily="34" charset="0"/>
+              <a:buChar char="•"/>
+            </a:pPr>
+            <a:r>
+              <a:rPr lang="en-US" altLang="en-US" sz="9600" dirty="0">
+                <a:solidFill>
+                  <a:schemeClr val="bg1"/>
+                </a:solidFill>
+                <a:latin typeface="Calibri" panose="020F0502020204030204" pitchFamily="34" charset="0"/>
+                <a:cs typeface="Calibri" panose="020F0502020204030204" pitchFamily="34" charset="0"/>
+              </a:rPr>
+              <a:t>Limit poster to &lt; 1000 words – it is a summary of your work so focus on the most important ideas and results.</a:t>
+            </a:r>
+          </a:p>
+          <a:p>
+            <a:pPr marL="457200" indent="-457200" eaLnBrk="1" hangingPunct="1">
+              <a:spcBef>
+                <a:spcPts val="321"/>
+              </a:spcBef>
+              <a:buFont typeface="Arial" panose="020B0604020202020204" pitchFamily="34" charset="0"/>
+              <a:buChar char="•"/>
+            </a:pPr>
+            <a:r>
+              <a:rPr lang="en-US" altLang="en-US" sz="9600" dirty="0">
+                <a:solidFill>
+                  <a:schemeClr val="bg1"/>
+                </a:solidFill>
+                <a:latin typeface="Calibri" panose="020F0502020204030204" pitchFamily="34" charset="0"/>
+                <a:cs typeface="Calibri" panose="020F0502020204030204" pitchFamily="34" charset="0"/>
+              </a:rPr>
+              <a:t>Spellcheck and then have someone else proofread it.</a:t>
+            </a:r>
+          </a:p>
+          <a:p>
+            <a:pPr algn="ctr" eaLnBrk="1" hangingPunct="1">
+              <a:spcBef>
+                <a:spcPts val="321"/>
+              </a:spcBef>
+            </a:pPr>
+            <a:endParaRPr lang="en-US" altLang="ja-JP" sz="9600" b="1" dirty="0">
+              <a:solidFill>
+                <a:schemeClr val="bg1"/>
+              </a:solidFill>
+              <a:latin typeface="Calibri" panose="020F0502020204030204" pitchFamily="34" charset="0"/>
+              <a:cs typeface="Calibri" panose="020F0502020204030204" pitchFamily="34" charset="0"/>
+            </a:endParaRPr>
+          </a:p>
+          <a:p>
+            <a:pPr eaLnBrk="1" hangingPunct="1">
+              <a:spcBef>
+                <a:spcPts val="321"/>
+              </a:spcBef>
+            </a:pPr>
+            <a:endParaRPr lang="en-US" altLang="ja-JP" sz="9600" dirty="0">
+              <a:solidFill>
+                <a:schemeClr val="bg1"/>
+              </a:solidFill>
+              <a:latin typeface="Calibri" panose="020F0502020204030204" pitchFamily="34" charset="0"/>
+              <a:cs typeface="Calibri" panose="020F0502020204030204" pitchFamily="34" charset="0"/>
+            </a:endParaRPr>
+          </a:p>
+          <a:p>
+            <a:pPr marL="457200" indent="-457200" eaLnBrk="1" hangingPunct="1">
+              <a:spcBef>
+                <a:spcPts val="321"/>
+              </a:spcBef>
+              <a:buFont typeface="Arial" panose="020B0604020202020204" pitchFamily="34" charset="0"/>
+              <a:buChar char="•"/>
+            </a:pPr>
+            <a:r>
+              <a:rPr lang="en-US" altLang="ja-JP" sz="9600" dirty="0">
+                <a:solidFill>
+                  <a:schemeClr val="bg1"/>
+                </a:solidFill>
+                <a:latin typeface="Calibri" panose="020F0502020204030204" pitchFamily="34" charset="0"/>
+                <a:cs typeface="Calibri" panose="020F0502020204030204" pitchFamily="34" charset="0"/>
+              </a:rPr>
+              <a:t>Use titles on graphs to summarize the main interpretation or takeaway from the graph or map</a:t>
+            </a:r>
+          </a:p>
+          <a:p>
+            <a:pPr marL="457200" indent="-457200" eaLnBrk="1" hangingPunct="1">
+              <a:spcBef>
+                <a:spcPts val="321"/>
+              </a:spcBef>
+              <a:buFont typeface="Arial" panose="020B0604020202020204" pitchFamily="34" charset="0"/>
+              <a:buChar char="•"/>
+            </a:pPr>
+            <a:r>
+              <a:rPr lang="en-US" altLang="ja-JP" sz="9600" dirty="0">
+                <a:solidFill>
+                  <a:schemeClr val="bg1"/>
+                </a:solidFill>
+                <a:latin typeface="Calibri" panose="020F0502020204030204" pitchFamily="34" charset="0"/>
+                <a:cs typeface="Calibri" panose="020F0502020204030204" pitchFamily="34" charset="0"/>
+              </a:rPr>
+              <a:t>Annotate with arrows and callout boxes so the viewer is </a:t>
+            </a:r>
+            <a:r>
+              <a:rPr lang="en-US" altLang="ja-JP" sz="9600" b="1" dirty="0">
+                <a:solidFill>
+                  <a:schemeClr val="bg1"/>
+                </a:solidFill>
+                <a:latin typeface="Calibri" panose="020F0502020204030204" pitchFamily="34" charset="0"/>
+                <a:cs typeface="Calibri" panose="020F0502020204030204" pitchFamily="34" charset="0"/>
+              </a:rPr>
+              <a:t>visually led</a:t>
+            </a:r>
+            <a:r>
+              <a:rPr lang="en-US" altLang="ja-JP" sz="9600" dirty="0">
+                <a:solidFill>
+                  <a:schemeClr val="bg1"/>
+                </a:solidFill>
+                <a:latin typeface="Calibri" panose="020F0502020204030204" pitchFamily="34" charset="0"/>
+                <a:cs typeface="Calibri" panose="020F0502020204030204" pitchFamily="34" charset="0"/>
+              </a:rPr>
+              <a:t> through how hypothesis is addressed. </a:t>
+            </a:r>
+          </a:p>
+          <a:p>
+            <a:pPr marL="457200" indent="-457200" eaLnBrk="1" hangingPunct="1">
+              <a:spcBef>
+                <a:spcPts val="321"/>
+              </a:spcBef>
+              <a:buFont typeface="Arial" panose="020B0604020202020204" pitchFamily="34" charset="0"/>
+              <a:buChar char="•"/>
+            </a:pPr>
+            <a:r>
+              <a:rPr lang="en-US" altLang="ja-JP" sz="9600" dirty="0">
+                <a:solidFill>
+                  <a:schemeClr val="bg1"/>
+                </a:solidFill>
+                <a:latin typeface="Calibri" panose="020F0502020204030204" pitchFamily="34" charset="0"/>
+                <a:cs typeface="Calibri" panose="020F0502020204030204" pitchFamily="34" charset="0"/>
+              </a:rPr>
+              <a:t>Help readers understand the logic behind your conclusions </a:t>
+            </a:r>
+            <a:r>
+              <a:rPr lang="en-US" altLang="ja-JP" sz="9600" i="1" dirty="0">
+                <a:solidFill>
+                  <a:schemeClr val="bg1"/>
+                </a:solidFill>
+                <a:latin typeface="Calibri" panose="020F0502020204030204" pitchFamily="34" charset="0"/>
+                <a:cs typeface="Calibri" panose="020F0502020204030204" pitchFamily="34" charset="0"/>
+              </a:rPr>
+              <a:t>without you needing to be there</a:t>
+            </a:r>
+            <a:r>
+              <a:rPr lang="en-US" altLang="ja-JP" sz="9600" dirty="0">
+                <a:solidFill>
+                  <a:schemeClr val="bg1"/>
+                </a:solidFill>
+                <a:latin typeface="Calibri" panose="020F0502020204030204" pitchFamily="34" charset="0"/>
+                <a:cs typeface="Calibri" panose="020F0502020204030204" pitchFamily="34" charset="0"/>
+              </a:rPr>
+              <a:t>.</a:t>
+            </a:r>
+          </a:p>
+          <a:p>
+            <a:pPr marL="457200" indent="-457200" eaLnBrk="1" hangingPunct="1">
+              <a:spcBef>
+                <a:spcPts val="321"/>
+              </a:spcBef>
+              <a:buFont typeface="Arial" panose="020B0604020202020204" pitchFamily="34" charset="0"/>
+              <a:buChar char="•"/>
+            </a:pPr>
+            <a:r>
+              <a:rPr lang="en-US" altLang="ja-JP" sz="9600" dirty="0">
+                <a:solidFill>
+                  <a:schemeClr val="bg1"/>
+                </a:solidFill>
+                <a:latin typeface="Calibri" panose="020F0502020204030204" pitchFamily="34" charset="0"/>
+                <a:cs typeface="Calibri" panose="020F0502020204030204" pitchFamily="34" charset="0"/>
+              </a:rPr>
+              <a:t>Keep font size of all text (even graph labels) as big or bigger than in rest of poster</a:t>
+            </a:r>
+          </a:p>
           <a:p>
             <a:pPr eaLnBrk="1" hangingPunct="1">
               <a:spcBef>
                 <a:spcPct val="0"/>
               </a:spcBef>
             </a:pPr>
-            <a:endParaRPr lang="en-US" altLang="en-US" sz="9600">
+            <a:endParaRPr lang="en-US" altLang="en-US" sz="9600" dirty="0">
               <a:solidFill>
                 <a:srgbClr val="000000"/>
               </a:solidFill>
@@ -4631,10 +4848,10 @@
         </p:nvGrpSpPr>
         <p:grpSpPr>
           <a:xfrm>
-            <a:off x="1200872" y="603653"/>
-            <a:ext cx="30332361" cy="20018377"/>
-            <a:chOff x="1173163" y="758824"/>
-            <a:chExt cx="30332361" cy="20018377"/>
+            <a:off x="1068793" y="631668"/>
+            <a:ext cx="30360664" cy="20018377"/>
+            <a:chOff x="1144860" y="758824"/>
+            <a:chExt cx="30360664" cy="20018377"/>
           </a:xfrm>
         </p:grpSpPr>
         <p:sp>
@@ -4823,7 +5040,7 @@
                   <a:latin typeface="Calibri" panose="020F0502020204030204" pitchFamily="34" charset="0"/>
                   <a:cs typeface="Calibri" panose="020F0502020204030204" pitchFamily="34" charset="0"/>
                 </a:rPr>
-                <a:t>State the most important result</a:t>
+                <a:t>Tree and LASSO as best Models</a:t>
               </a:r>
             </a:p>
             <a:p>
@@ -4844,181 +5061,6 @@
               </a:r>
             </a:p>
             <a:p>
-              <a:pPr algn="ctr" eaLnBrk="1" hangingPunct="1">
-                <a:spcBef>
-                  <a:spcPts val="321"/>
-                </a:spcBef>
-              </a:pPr>
-              <a:endParaRPr lang="en-US" altLang="ja-JP" sz="8000" b="1" dirty="0">
-                <a:solidFill>
-                  <a:schemeClr val="bg1"/>
-                </a:solidFill>
-                <a:latin typeface="Calibri" panose="020F0502020204030204" pitchFamily="34" charset="0"/>
-                <a:cs typeface="Calibri" panose="020F0502020204030204" pitchFamily="34" charset="0"/>
-              </a:endParaRPr>
-            </a:p>
-            <a:p>
-              <a:pPr algn="ctr" eaLnBrk="1" hangingPunct="1">
-                <a:spcBef>
-                  <a:spcPts val="321"/>
-                </a:spcBef>
-              </a:pPr>
-              <a:endParaRPr lang="en-US" altLang="ja-JP" sz="8000" b="1" dirty="0">
-                <a:solidFill>
-                  <a:schemeClr val="bg1"/>
-                </a:solidFill>
-                <a:latin typeface="Calibri" panose="020F0502020204030204" pitchFamily="34" charset="0"/>
-                <a:cs typeface="Calibri" panose="020F0502020204030204" pitchFamily="34" charset="0"/>
-              </a:endParaRPr>
-            </a:p>
-            <a:p>
-              <a:pPr algn="ctr" eaLnBrk="1" hangingPunct="1">
-                <a:spcBef>
-                  <a:spcPts val="321"/>
-                </a:spcBef>
-              </a:pPr>
-              <a:r>
-                <a:rPr lang="en-US" altLang="ja-JP" sz="8000" b="1" dirty="0">
-                  <a:solidFill>
-                    <a:schemeClr val="bg1"/>
-                  </a:solidFill>
-                  <a:latin typeface="Calibri" panose="020F0502020204030204" pitchFamily="34" charset="0"/>
-                  <a:cs typeface="Calibri" panose="020F0502020204030204" pitchFamily="34" charset="0"/>
-                </a:rPr>
-                <a:t>Show the most important images. </a:t>
-              </a:r>
-            </a:p>
-            <a:p>
-              <a:pPr eaLnBrk="1" hangingPunct="1">
-                <a:spcBef>
-                  <a:spcPts val="321"/>
-                </a:spcBef>
-              </a:pPr>
-              <a:endParaRPr lang="en-US" altLang="ja-JP" dirty="0">
-                <a:solidFill>
-                  <a:schemeClr val="bg1"/>
-                </a:solidFill>
-                <a:latin typeface="Calibri" panose="020F0502020204030204" pitchFamily="34" charset="0"/>
-                <a:cs typeface="Calibri" panose="020F0502020204030204" pitchFamily="34" charset="0"/>
-              </a:endParaRPr>
-            </a:p>
-            <a:p>
-              <a:pPr marL="457200" indent="-457200" eaLnBrk="1" hangingPunct="1">
-                <a:spcBef>
-                  <a:spcPts val="321"/>
-                </a:spcBef>
-                <a:buFont typeface="Arial" panose="020B0604020202020204" pitchFamily="34" charset="0"/>
-                <a:buChar char="•"/>
-              </a:pPr>
-              <a:r>
-                <a:rPr lang="en-US" altLang="ja-JP" dirty="0">
-                  <a:solidFill>
-                    <a:schemeClr val="bg1"/>
-                  </a:solidFill>
-                  <a:latin typeface="Calibri" panose="020F0502020204030204" pitchFamily="34" charset="0"/>
-                  <a:cs typeface="Calibri" panose="020F0502020204030204" pitchFamily="34" charset="0"/>
-                </a:rPr>
-                <a:t>Use titles on graphs to summarize the main interpretation or takeaway from the graph or map</a:t>
-              </a:r>
-            </a:p>
-            <a:p>
-              <a:pPr marL="457200" indent="-457200" eaLnBrk="1" hangingPunct="1">
-                <a:spcBef>
-                  <a:spcPts val="321"/>
-                </a:spcBef>
-                <a:buFont typeface="Arial" panose="020B0604020202020204" pitchFamily="34" charset="0"/>
-                <a:buChar char="•"/>
-              </a:pPr>
-              <a:r>
-                <a:rPr lang="en-US" altLang="ja-JP" dirty="0">
-                  <a:solidFill>
-                    <a:schemeClr val="bg1"/>
-                  </a:solidFill>
-                  <a:latin typeface="Calibri" panose="020F0502020204030204" pitchFamily="34" charset="0"/>
-                  <a:cs typeface="Calibri" panose="020F0502020204030204" pitchFamily="34" charset="0"/>
-                </a:rPr>
-                <a:t>Annotate with arrows and callout boxes so the viewer is </a:t>
-              </a:r>
-              <a:r>
-                <a:rPr lang="en-US" altLang="ja-JP" b="1" dirty="0">
-                  <a:solidFill>
-                    <a:schemeClr val="bg1"/>
-                  </a:solidFill>
-                  <a:latin typeface="Calibri" panose="020F0502020204030204" pitchFamily="34" charset="0"/>
-                  <a:cs typeface="Calibri" panose="020F0502020204030204" pitchFamily="34" charset="0"/>
-                </a:rPr>
-                <a:t>visually led</a:t>
-              </a:r>
-              <a:r>
-                <a:rPr lang="en-US" altLang="ja-JP" dirty="0">
-                  <a:solidFill>
-                    <a:schemeClr val="bg1"/>
-                  </a:solidFill>
-                  <a:latin typeface="Calibri" panose="020F0502020204030204" pitchFamily="34" charset="0"/>
-                  <a:cs typeface="Calibri" panose="020F0502020204030204" pitchFamily="34" charset="0"/>
-                </a:rPr>
-                <a:t> through how hypothesis is addressed. </a:t>
-              </a:r>
-            </a:p>
-            <a:p>
-              <a:pPr marL="457200" indent="-457200" eaLnBrk="1" hangingPunct="1">
-                <a:spcBef>
-                  <a:spcPts val="321"/>
-                </a:spcBef>
-                <a:buFont typeface="Arial" panose="020B0604020202020204" pitchFamily="34" charset="0"/>
-                <a:buChar char="•"/>
-              </a:pPr>
-              <a:r>
-                <a:rPr lang="en-US" altLang="ja-JP" dirty="0">
-                  <a:solidFill>
-                    <a:schemeClr val="bg1"/>
-                  </a:solidFill>
-                  <a:latin typeface="Calibri" panose="020F0502020204030204" pitchFamily="34" charset="0"/>
-                  <a:cs typeface="Calibri" panose="020F0502020204030204" pitchFamily="34" charset="0"/>
-                </a:rPr>
-                <a:t>Help readers understand the logic behind your conclusions </a:t>
-              </a:r>
-              <a:r>
-                <a:rPr lang="en-US" altLang="ja-JP" i="1" dirty="0">
-                  <a:solidFill>
-                    <a:schemeClr val="bg1"/>
-                  </a:solidFill>
-                  <a:latin typeface="Calibri" panose="020F0502020204030204" pitchFamily="34" charset="0"/>
-                  <a:cs typeface="Calibri" panose="020F0502020204030204" pitchFamily="34" charset="0"/>
-                </a:rPr>
-                <a:t>without you needing to be there</a:t>
-              </a:r>
-              <a:r>
-                <a:rPr lang="en-US" altLang="ja-JP" dirty="0">
-                  <a:solidFill>
-                    <a:schemeClr val="bg1"/>
-                  </a:solidFill>
-                  <a:latin typeface="Calibri" panose="020F0502020204030204" pitchFamily="34" charset="0"/>
-                  <a:cs typeface="Calibri" panose="020F0502020204030204" pitchFamily="34" charset="0"/>
-                </a:rPr>
-                <a:t>.</a:t>
-              </a:r>
-            </a:p>
-            <a:p>
-              <a:pPr marL="457200" indent="-457200" eaLnBrk="1" hangingPunct="1">
-                <a:spcBef>
-                  <a:spcPts val="321"/>
-                </a:spcBef>
-                <a:buFont typeface="Arial" panose="020B0604020202020204" pitchFamily="34" charset="0"/>
-                <a:buChar char="•"/>
-              </a:pPr>
-              <a:r>
-                <a:rPr lang="en-US" altLang="ja-JP" dirty="0">
-                  <a:solidFill>
-                    <a:schemeClr val="bg1"/>
-                  </a:solidFill>
-                  <a:latin typeface="Calibri" panose="020F0502020204030204" pitchFamily="34" charset="0"/>
-                  <a:cs typeface="Calibri" panose="020F0502020204030204" pitchFamily="34" charset="0"/>
-                </a:rPr>
-                <a:t>Keep font size of all text (even graph labels) as big or bigger than in rest of poster</a:t>
-              </a:r>
-            </a:p>
-            <a:p>
               <a:pPr marL="457200" indent="-457200" eaLnBrk="1" hangingPunct="1">
                 <a:spcBef>
                   <a:spcPts val="321"/>
@@ -5033,61 +5075,6 @@
                 <a:latin typeface="Calibri" panose="020F0502020204030204" pitchFamily="34" charset="0"/>
                 <a:cs typeface="Calibri" panose="020F0502020204030204" pitchFamily="34" charset="0"/>
               </a:endParaRPr>
-            </a:p>
-            <a:p>
-              <a:pPr eaLnBrk="1" hangingPunct="1">
-                <a:spcBef>
-                  <a:spcPts val="321"/>
-                </a:spcBef>
-              </a:pPr>
-              <a:r>
-                <a:rPr lang="en-US" altLang="en-US" sz="4400" dirty="0">
-                  <a:solidFill>
-                    <a:schemeClr val="bg1"/>
-                  </a:solidFill>
-                  <a:latin typeface="Calibri" panose="020F0502020204030204" pitchFamily="34" charset="0"/>
-                  <a:cs typeface="Calibri" panose="020F0502020204030204" pitchFamily="34" charset="0"/>
-                </a:rPr>
-                <a:t>General Guidance</a:t>
-              </a:r>
-            </a:p>
-            <a:p>
-              <a:pPr marL="457200" indent="-457200" eaLnBrk="1" hangingPunct="1">
-                <a:spcBef>
-                  <a:spcPts val="321"/>
-                </a:spcBef>
-                <a:buFont typeface="Arial" panose="020B0604020202020204" pitchFamily="34" charset="0"/>
-                <a:buChar char="•"/>
-              </a:pPr>
-              <a:r>
-                <a:rPr lang="en-US" altLang="en-US" sz="4400" dirty="0">
-                  <a:solidFill>
-                    <a:schemeClr val="bg1"/>
-                  </a:solidFill>
-                  <a:latin typeface="Calibri" panose="020F0502020204030204" pitchFamily="34" charset="0"/>
-                  <a:cs typeface="Calibri" panose="020F0502020204030204" pitchFamily="34" charset="0"/>
-                </a:rPr>
-                <a:t>Limit poster to &lt; 1000 words – it is a summary of your work so focus on the most important ideas and results.</a:t>
-              </a:r>
-            </a:p>
-            <a:p>
-              <a:pPr marL="457200" indent="-457200" eaLnBrk="1" hangingPunct="1">
-                <a:spcBef>
-                  <a:spcPts val="321"/>
-                </a:spcBef>
-                <a:buFont typeface="Arial" panose="020B0604020202020204" pitchFamily="34" charset="0"/>
-                <a:buChar char="•"/>
-              </a:pPr>
-              <a:r>
-                <a:rPr lang="en-US" altLang="en-US" sz="4400" dirty="0">
-                  <a:solidFill>
-                    <a:schemeClr val="bg1"/>
-                  </a:solidFill>
-                  <a:latin typeface="Calibri" panose="020F0502020204030204" pitchFamily="34" charset="0"/>
-                  <a:cs typeface="Calibri" panose="020F0502020204030204" pitchFamily="34" charset="0"/>
-                </a:rPr>
-                <a:t>Spellcheck and then have someone else proofread it.</a:t>
-              </a:r>
             </a:p>
           </p:txBody>
         </p:sp>
@@ -5105,10 +5092,10 @@
           </p:nvGrpSpPr>
           <p:grpSpPr>
             <a:xfrm>
-              <a:off x="1173163" y="758825"/>
-              <a:ext cx="6858000" cy="20018375"/>
-              <a:chOff x="1173163" y="758825"/>
-              <a:chExt cx="6858000" cy="20018375"/>
+              <a:off x="1144860" y="758825"/>
+              <a:ext cx="6894344" cy="20018375"/>
+              <a:chOff x="1144860" y="758825"/>
+              <a:chExt cx="6894344" cy="20018375"/>
             </a:xfrm>
           </p:grpSpPr>
           <p:sp>
@@ -5128,7 +5115,7 @@
             <p:spPr bwMode="auto">
               <a:xfrm>
                 <a:off x="1173163" y="5289663"/>
-                <a:ext cx="6858000" cy="6062290"/>
+                <a:ext cx="6858000" cy="7565970"/>
               </a:xfrm>
               <a:prstGeom prst="rect">
                 <a:avLst/>
@@ -5308,7 +5295,7 @@
                   <a:buChar char="•"/>
                 </a:pPr>
                 <a:r>
-                  <a:rPr lang="en-US" altLang="ja-JP" sz="2400" dirty="0">
+                  <a:rPr lang="en-US" altLang="ja-JP" sz="2800" dirty="0">
                     <a:latin typeface="Calibri" panose="020F0502020204030204" pitchFamily="34" charset="0"/>
                     <a:cs typeface="Calibri" panose="020F0502020204030204" pitchFamily="34" charset="0"/>
                   </a:rPr>
@@ -5324,7 +5311,7 @@
                   <a:buChar char="•"/>
                 </a:pPr>
                 <a:r>
-                  <a:rPr lang="en-US" dirty="0">
+                  <a:rPr lang="en-US" sz="3600" dirty="0">
                     <a:latin typeface="Calibri" panose="020F0502020204030204" pitchFamily="34" charset="0"/>
                     <a:cs typeface="Calibri" panose="020F0502020204030204" pitchFamily="34" charset="0"/>
                   </a:rPr>
@@ -5340,7 +5327,7 @@
                   <a:buChar char="•"/>
                 </a:pPr>
                 <a:r>
-                  <a:rPr lang="en-US" sz="2400" dirty="0">
+                  <a:rPr lang="en-US" sz="2800" dirty="0">
                     <a:latin typeface="Calibri" panose="020F0502020204030204" pitchFamily="34" charset="0"/>
                     <a:cs typeface="Calibri" panose="020F0502020204030204" pitchFamily="34" charset="0"/>
                   </a:rPr>
@@ -5356,7 +5343,7 @@
                   <a:buChar char="•"/>
                 </a:pPr>
                 <a:r>
-                  <a:rPr lang="en-US" dirty="0">
+                  <a:rPr lang="en-US" sz="3600" dirty="0">
                     <a:latin typeface="Calibri" panose="020F0502020204030204" pitchFamily="34" charset="0"/>
                     <a:cs typeface="Calibri" panose="020F0502020204030204" pitchFamily="34" charset="0"/>
                   </a:rPr>
@@ -5372,14 +5359,14 @@
                   <a:buChar char="•"/>
                 </a:pPr>
                 <a:r>
-                  <a:rPr lang="en-US" sz="2800" dirty="0">
+                  <a:rPr lang="en-US" dirty="0">
                     <a:latin typeface="Calibri" panose="020F0502020204030204" pitchFamily="34" charset="0"/>
                     <a:cs typeface="Calibri" panose="020F0502020204030204" pitchFamily="34" charset="0"/>
                   </a:rPr>
                   <a:t> How c</a:t>
                 </a:r>
                 <a:r>
-                  <a:rPr lang="en-US" sz="2400" dirty="0">
+                  <a:rPr lang="en-US" sz="2800" dirty="0">
                     <a:latin typeface="Calibri" panose="020F0502020204030204" pitchFamily="34" charset="0"/>
                     <a:cs typeface="Calibri" panose="020F0502020204030204" pitchFamily="34" charset="0"/>
                   </a:rPr>
@@ -5415,8 +5402,8 @@
             </p:nvSpPr>
             <p:spPr bwMode="auto">
               <a:xfrm>
-                <a:off x="1173163" y="11834091"/>
-                <a:ext cx="6858000" cy="5633316"/>
+                <a:off x="1181204" y="17206042"/>
+                <a:ext cx="6858000" cy="3571158"/>
               </a:xfrm>
               <a:prstGeom prst="rect">
                 <a:avLst/>
@@ -5616,7 +5603,7 @@
                     <a:latin typeface="Calibri" panose="020F0502020204030204" pitchFamily="34" charset="0"/>
                     <a:cs typeface="Calibri" panose="020F0502020204030204" pitchFamily="34" charset="0"/>
                   </a:rPr>
-                  <a:t>Using logistic regression, KNN, LDA, QDA, PCR, PLS to predict whether a loan was forgiven in whole or not. </a:t>
+                  <a:t>Using KNN, LDA, QDA, and trees to predict business type.</a:t>
                 </a:r>
               </a:p>
               <a:p>
@@ -5635,7 +5622,7 @@
                     <a:latin typeface="Calibri" panose="020F0502020204030204" pitchFamily="34" charset="0"/>
                     <a:cs typeface="Calibri" panose="020F0502020204030204" pitchFamily="34" charset="0"/>
                   </a:rPr>
-                  <a:t>Using linear regression (with cross-validation) to quantify the numerical effect of business characteristics on amount forgiven. </a:t>
+                  <a:t>Using PCR, PLS, ridge, stepwise, and LASSO to predict the amount forgiven</a:t>
                 </a:r>
                 <a:endParaRPr lang="en-US" altLang="en-US" dirty="0">
                   <a:latin typeface="Calibri" panose="020F0502020204030204" pitchFamily="34" charset="0"/>
@@ -5875,14 +5862,14 @@
               </a:ln>
               <a:extLst>
                 <a:ext uri="{909E8E84-426E-40dd-AFC4-6F175D3DCCD1}">
-                  <a14:hiddenFill xmlns:a14="http://schemas.microsoft.com/office/drawing/2010/main" xmlns="">
+                  <a14:hiddenFill xmlns="" xmlns:a14="http://schemas.microsoft.com/office/drawing/2010/main">
                     <a:solidFill>
                       <a:srgbClr val="FFFFFF"/>
                     </a:solidFill>
                   </a14:hiddenFill>
                 </a:ext>
                 <a:ext uri="{91240B29-F687-4f45-9708-019B960494DF}">
-                  <a14:hiddenLine xmlns:a14="http://schemas.microsoft.com/office/drawing/2010/main" xmlns="" w="9525">
+                  <a14:hiddenLine xmlns="" xmlns:a14="http://schemas.microsoft.com/office/drawing/2010/main" w="9525">
                     <a:solidFill>
                       <a:srgbClr val="000000"/>
                     </a:solidFill>
@@ -5895,7 +5882,7 @@
             </p:spPr>
             <p:txBody>
               <a:bodyPr wrap="square" lIns="91440" tIns="91440" rIns="91440" bIns="91440" anchor="ctr" anchorCtr="1">
-                <a:normAutofit/>
+                <a:normAutofit fontScale="92500" lnSpcReduction="10000"/>
               </a:bodyPr>
               <a:lstStyle/>
               <a:p>
@@ -5916,7 +5903,7 @@
                     <a:ea typeface="ＭＳ Ｐゴシック" charset="0"/>
                     <a:cs typeface="Calibri" panose="020F0502020204030204" pitchFamily="34" charset="0"/>
                   </a:rPr>
-                  <a:t>A sentence for your main result using words a general audience might find interesting or provocative.</a:t>
+                  <a:t>A Tree and LASSO model to best predict business types and PPP Loan Forgiveness Amounts respectively  to better understand loan for loan forgiveness models.</a:t>
                 </a:r>
               </a:p>
             </p:txBody>
@@ -5937,8 +5924,8 @@
             </p:nvSpPr>
             <p:spPr bwMode="auto">
               <a:xfrm>
-                <a:off x="1173163" y="17949545"/>
-                <a:ext cx="6858000" cy="2827655"/>
+                <a:off x="1144860" y="13244732"/>
+                <a:ext cx="6858000" cy="3571158"/>
               </a:xfrm>
               <a:prstGeom prst="rect">
                 <a:avLst/>
@@ -6113,7 +6100,7 @@
                     <a:latin typeface="Calibri" panose="020F0502020204030204" pitchFamily="34" charset="0"/>
                     <a:cs typeface="Calibri" panose="020F0502020204030204" pitchFamily="34" charset="0"/>
                   </a:rPr>
-                  <a:t>Size/Scale</a:t>
+                  <a:t>Size/Scale ~23,000 rows</a:t>
                 </a:r>
               </a:p>
               <a:p>
@@ -6141,7 +6128,7 @@
                   <a:buChar char="•"/>
                 </a:pPr>
                 <a:r>
-                  <a:rPr lang="en-US" altLang="en-US" sz="2000" dirty="0">
+                  <a:rPr lang="en-US" altLang="en-US" sz="2800" dirty="0">
                     <a:latin typeface="Calibri" panose="020F0502020204030204" pitchFamily="34" charset="0"/>
                     <a:cs typeface="Calibri" panose="020F0502020204030204" pitchFamily="34" charset="0"/>
                   </a:rPr>
@@ -6188,7 +6175,7 @@
             <p:spPr bwMode="auto">
               <a:xfrm>
                 <a:off x="24917399" y="758824"/>
-                <a:ext cx="6585773" cy="9032875"/>
+                <a:ext cx="6585773" cy="9329626"/>
               </a:xfrm>
               <a:prstGeom prst="rect">
                 <a:avLst/>
@@ -6371,7 +6358,7 @@
                     <a:latin typeface="Calibri" panose="020F0502020204030204" pitchFamily="34" charset="0"/>
                     <a:cs typeface="Calibri" panose="020F0502020204030204" pitchFamily="34" charset="0"/>
                   </a:rPr>
-                  <a:t>Why is the outcome  interesting. Don’t assume it’s obvious. </a:t>
+                  <a:t>Our results show that a few business characteristics are important, but not perfect, in predicting loan forgiveness and classifying industry. </a:t>
                 </a:r>
               </a:p>
               <a:p>
@@ -6387,7 +6374,7 @@
                     <a:latin typeface="Calibri" panose="020F0502020204030204" pitchFamily="34" charset="0"/>
                     <a:cs typeface="Calibri" panose="020F0502020204030204" pitchFamily="34" charset="0"/>
                   </a:rPr>
-                  <a:t>Evidence for the results</a:t>
+                  <a:t>As ML becomes more prevalent in the financial industry understanding how these methods perform for key business components is important for loan forgiveness and fraud reduction.</a:t>
                 </a:r>
               </a:p>
               <a:p>
@@ -6403,170 +6390,19 @@
                     <a:latin typeface="Calibri" panose="020F0502020204030204" pitchFamily="34" charset="0"/>
                     <a:cs typeface="Calibri" panose="020F0502020204030204" pitchFamily="34" charset="0"/>
                   </a:rPr>
-                  <a:t>Potential Next Steps</a:t>
+                  <a:t>Using our models to predict on more recent PPP loan forgiveness</a:t>
                 </a:r>
               </a:p>
-            </p:txBody>
-          </p:sp>
-          <p:sp>
-            <p:nvSpPr>
-              <p:cNvPr id="14347" name="Text Box 70">
-                <a:extLst>
-                  <a:ext uri="{FF2B5EF4-FFF2-40B4-BE49-F238E27FC236}">
-                    <a16:creationId xmlns:a16="http://schemas.microsoft.com/office/drawing/2014/main" id="{4772201D-98FD-40DC-CE9D-CCD6C757C830}"/>
-                  </a:ext>
-                </a:extLst>
-              </p:cNvPr>
-              <p:cNvSpPr txBox="1">
-                <a:spLocks noChangeArrowheads="1"/>
-              </p:cNvSpPr>
-              <p:nvPr/>
-            </p:nvSpPr>
-            <p:spPr bwMode="auto">
-              <a:xfrm>
-                <a:off x="24917399" y="15011400"/>
-                <a:ext cx="6588125" cy="2438400"/>
-              </a:xfrm>
-              <a:prstGeom prst="rect">
-                <a:avLst/>
-              </a:prstGeom>
-              <a:solidFill>
-                <a:schemeClr val="bg1"/>
-              </a:solidFill>
-              <a:ln w="38100">
-                <a:solidFill>
-                  <a:srgbClr val="004FA2"/>
-                </a:solidFill>
-                <a:round/>
-                <a:headEnd/>
-                <a:tailEnd/>
-              </a:ln>
-            </p:spPr>
-            <p:txBody>
-              <a:bodyPr lIns="274320" tIns="182880" rIns="274320" bIns="182880"/>
-              <a:lstStyle>
-                <a:lvl1pPr eaLnBrk="0" hangingPunct="0">
-                  <a:defRPr sz="3200">
-                    <a:solidFill>
-                      <a:schemeClr val="tx1"/>
-                    </a:solidFill>
-                    <a:latin typeface="Helvetica" pitchFamily="2" charset="0"/>
-                    <a:ea typeface="ＭＳ Ｐゴシック" panose="020B0600070205080204" pitchFamily="34" charset="-128"/>
-                  </a:defRPr>
-                </a:lvl1pPr>
-                <a:lvl2pPr marL="742950" indent="-285750" eaLnBrk="0" hangingPunct="0">
-                  <a:defRPr sz="3200">
-                    <a:solidFill>
-                      <a:schemeClr val="tx1"/>
-                    </a:solidFill>
-                    <a:latin typeface="Helvetica" pitchFamily="2" charset="0"/>
-                    <a:ea typeface="ＭＳ Ｐゴシック" panose="020B0600070205080204" pitchFamily="34" charset="-128"/>
-                  </a:defRPr>
-                </a:lvl2pPr>
-                <a:lvl3pPr marL="1143000" indent="-228600" eaLnBrk="0" hangingPunct="0">
-                  <a:defRPr sz="3200">
-                    <a:solidFill>
-                      <a:schemeClr val="tx1"/>
-                    </a:solidFill>
-                    <a:latin typeface="Helvetica" pitchFamily="2" charset="0"/>
-                    <a:ea typeface="ＭＳ Ｐゴシック" panose="020B0600070205080204" pitchFamily="34" charset="-128"/>
-                  </a:defRPr>
-                </a:lvl3pPr>
-                <a:lvl4pPr marL="1600200" indent="-228600" eaLnBrk="0" hangingPunct="0">
-                  <a:defRPr sz="3200">
-                    <a:solidFill>
-                      <a:schemeClr val="tx1"/>
-                    </a:solidFill>
-                    <a:latin typeface="Helvetica" pitchFamily="2" charset="0"/>
-                    <a:ea typeface="ＭＳ Ｐゴシック" panose="020B0600070205080204" pitchFamily="34" charset="-128"/>
-                  </a:defRPr>
-                </a:lvl4pPr>
-                <a:lvl5pPr marL="2057400" indent="-228600" eaLnBrk="0" hangingPunct="0">
-                  <a:defRPr sz="3200">
-                    <a:solidFill>
-                      <a:schemeClr val="tx1"/>
-                    </a:solidFill>
-                    <a:latin typeface="Helvetica" pitchFamily="2" charset="0"/>
-                    <a:ea typeface="ＭＳ Ｐゴシック" panose="020B0600070205080204" pitchFamily="34" charset="-128"/>
-                  </a:defRPr>
-                </a:lvl5pPr>
-                <a:lvl6pPr marL="2514600" indent="-228600" eaLnBrk="0" fontAlgn="base" hangingPunct="0">
-                  <a:spcBef>
-                    <a:spcPct val="0"/>
-                  </a:spcBef>
-                  <a:spcAft>
-                    <a:spcPct val="0"/>
-                  </a:spcAft>
-                  <a:defRPr sz="3200">
-                    <a:solidFill>
-                      <a:schemeClr val="tx1"/>
-                    </a:solidFill>
-                    <a:latin typeface="Helvetica" pitchFamily="2" charset="0"/>
-                    <a:ea typeface="ＭＳ Ｐゴシック" panose="020B0600070205080204" pitchFamily="34" charset="-128"/>
-                  </a:defRPr>
-                </a:lvl6pPr>
-                <a:lvl7pPr marL="2971800" indent="-228600" eaLnBrk="0" fontAlgn="base" hangingPunct="0">
-                  <a:spcBef>
-                    <a:spcPct val="0"/>
-                  </a:spcBef>
-                  <a:spcAft>
-                    <a:spcPct val="0"/>
-                  </a:spcAft>
-                  <a:defRPr sz="3200">
-                    <a:solidFill>
-                      <a:schemeClr val="tx1"/>
-                    </a:solidFill>
-                    <a:latin typeface="Helvetica" pitchFamily="2" charset="0"/>
-                    <a:ea typeface="ＭＳ Ｐゴシック" panose="020B0600070205080204" pitchFamily="34" charset="-128"/>
-                  </a:defRPr>
-                </a:lvl7pPr>
-                <a:lvl8pPr marL="3429000" indent="-228600" eaLnBrk="0" fontAlgn="base" hangingPunct="0">
-                  <a:spcBef>
-                    <a:spcPct val="0"/>
-                  </a:spcBef>
-                  <a:spcAft>
-                    <a:spcPct val="0"/>
-                  </a:spcAft>
-                  <a:defRPr sz="3200">
-                    <a:solidFill>
-                      <a:schemeClr val="tx1"/>
-                    </a:solidFill>
-                    <a:latin typeface="Helvetica" pitchFamily="2" charset="0"/>
-                    <a:ea typeface="ＭＳ Ｐゴシック" panose="020B0600070205080204" pitchFamily="34" charset="-128"/>
-                  </a:defRPr>
-                </a:lvl8pPr>
-                <a:lvl9pPr marL="3886200" indent="-228600" eaLnBrk="0" fontAlgn="base" hangingPunct="0">
-                  <a:spcBef>
-                    <a:spcPct val="0"/>
-                  </a:spcBef>
-                  <a:spcAft>
-                    <a:spcPct val="0"/>
-                  </a:spcAft>
-                  <a:defRPr sz="3200">
-                    <a:solidFill>
-                      <a:schemeClr val="tx1"/>
-                    </a:solidFill>
-                    <a:latin typeface="Helvetica" pitchFamily="2" charset="0"/>
-                    <a:ea typeface="ＭＳ Ｐゴシック" panose="020B0600070205080204" pitchFamily="34" charset="-128"/>
-                  </a:defRPr>
-                </a:lvl9pPr>
-              </a:lstStyle>
               <a:p>
                 <a:pPr eaLnBrk="1" hangingPunct="1">
                   <a:spcBef>
                     <a:spcPct val="50000"/>
                   </a:spcBef>
                 </a:pPr>
-                <a:r>
-                  <a:rPr lang="en-US" altLang="en-US" b="1" dirty="0">
-                    <a:solidFill>
-                      <a:srgbClr val="000000"/>
-                    </a:solidFill>
-                    <a:latin typeface="Calibri" panose="020F0502020204030204" pitchFamily="34" charset="0"/>
-                    <a:cs typeface="Calibri" panose="020F0502020204030204" pitchFamily="34" charset="0"/>
-                  </a:rPr>
-                  <a:t>Acknowledgments</a:t>
-                </a:r>
+                <a:endParaRPr lang="en-US" altLang="ja-JP" dirty="0">
+                  <a:latin typeface="Calibri" panose="020F0502020204030204" pitchFamily="34" charset="0"/>
+                  <a:cs typeface="Calibri" panose="020F0502020204030204" pitchFamily="34" charset="0"/>
+                </a:endParaRPr>
               </a:p>
             </p:txBody>
           </p:sp>
@@ -6586,8 +6422,8 @@
             </p:nvSpPr>
             <p:spPr bwMode="auto">
               <a:xfrm>
-                <a:off x="24917399" y="10401301"/>
-                <a:ext cx="6588125" cy="4118264"/>
+                <a:off x="24917399" y="10508877"/>
+                <a:ext cx="6588125" cy="7015797"/>
               </a:xfrm>
               <a:prstGeom prst="rect">
                 <a:avLst/>
@@ -6774,7 +6610,7 @@
                     <a:latin typeface="Calibri" panose="020F0502020204030204" pitchFamily="34" charset="0"/>
                     <a:cs typeface="Calibri" panose="020F0502020204030204" pitchFamily="34" charset="0"/>
                   </a:rPr>
-                  <a:t>What  constrained the approach</a:t>
+                  <a:t>Assumed that the data collected by the SBA Is accurate for all loans</a:t>
                 </a:r>
               </a:p>
               <a:p>
@@ -6790,7 +6626,7 @@
                     <a:latin typeface="Calibri" panose="020F0502020204030204" pitchFamily="34" charset="0"/>
                     <a:cs typeface="Calibri" panose="020F0502020204030204" pitchFamily="34" charset="0"/>
                   </a:rPr>
-                  <a:t>What assumptions need to be checked or were checked</a:t>
+                  <a:t>Limited Data Availability</a:t>
                 </a:r>
               </a:p>
               <a:p>
@@ -6806,7 +6642,39 @@
                     <a:latin typeface="Calibri" panose="020F0502020204030204" pitchFamily="34" charset="0"/>
                     <a:cs typeface="Calibri" panose="020F0502020204030204" pitchFamily="34" charset="0"/>
                   </a:rPr>
-                  <a:t>Ethical Considerations</a:t>
+                  <a:t>Results not generalizable beyond D.C.</a:t>
+                </a:r>
+              </a:p>
+              <a:p>
+                <a:pPr marL="457200" indent="-457200" eaLnBrk="1" hangingPunct="1">
+                  <a:spcBef>
+                    <a:spcPct val="10000"/>
+                  </a:spcBef>
+                  <a:buFont typeface="Arial" panose="020B0604020202020204" pitchFamily="34" charset="0"/>
+                  <a:buChar char="•"/>
+                </a:pPr>
+                <a:r>
+                  <a:rPr lang="en-US" altLang="en-US" dirty="0">
+                    <a:latin typeface="Calibri" panose="020F0502020204030204" pitchFamily="34" charset="0"/>
+                    <a:cs typeface="Calibri" panose="020F0502020204030204" pitchFamily="34" charset="0"/>
+                  </a:rPr>
+                  <a:t>Assumed Proxies were accurate representations of the enterprises</a:t>
+                </a:r>
+              </a:p>
+              <a:p>
+                <a:pPr marL="457200" indent="-457200" eaLnBrk="1" hangingPunct="1">
+                  <a:spcBef>
+                    <a:spcPct val="10000"/>
+                  </a:spcBef>
+                  <a:buFont typeface="Arial" panose="020B0604020202020204" pitchFamily="34" charset="0"/>
+                  <a:buChar char="•"/>
+                </a:pPr>
+                <a:r>
+                  <a:rPr lang="en-US" altLang="en-US" dirty="0">
+                    <a:latin typeface="Calibri" panose="020F0502020204030204" pitchFamily="34" charset="0"/>
+                    <a:cs typeface="Calibri" panose="020F0502020204030204" pitchFamily="34" charset="0"/>
+                  </a:rPr>
+                  <a:t>Inherent barriers in filing for PPP forgiveness </a:t>
                 </a:r>
               </a:p>
               <a:p>
@@ -7124,208 +6992,6 @@
       </p:pic>
       <p:sp>
         <p:nvSpPr>
-          <p:cNvPr id="2" name="Rectangle 1">
-            <a:extLst>
-              <a:ext uri="{FF2B5EF4-FFF2-40B4-BE49-F238E27FC236}">
-                <a16:creationId xmlns:a16="http://schemas.microsoft.com/office/drawing/2014/main" id="{A737C7D3-AF74-517E-59B4-398B6F404892}"/>
-              </a:ext>
-            </a:extLst>
-          </p:cNvPr>
-          <p:cNvSpPr/>
-          <p:nvPr/>
-        </p:nvSpPr>
-        <p:spPr>
-          <a:xfrm>
-            <a:off x="9619673" y="2832100"/>
-            <a:ext cx="6502400" cy="4546600"/>
-          </a:xfrm>
-          <a:prstGeom prst="rect">
-            <a:avLst/>
-          </a:prstGeom>
-        </p:spPr>
-        <p:style>
-          <a:lnRef idx="3">
-            <a:schemeClr val="lt1"/>
-          </a:lnRef>
-          <a:fillRef idx="1">
-            <a:schemeClr val="accent3"/>
-          </a:fillRef>
-          <a:effectRef idx="1">
-            <a:schemeClr val="accent3"/>
-          </a:effectRef>
-          <a:fontRef idx="minor">
-            <a:schemeClr val="lt1"/>
-          </a:fontRef>
-        </p:style>
-        <p:txBody>
-          <a:bodyPr rtlCol="0" anchor="ctr"/>
-          <a:lstStyle/>
-          <a:p>
-            <a:pPr algn="ctr"/>
-            <a:endParaRPr lang="en-US"/>
-          </a:p>
-        </p:txBody>
-      </p:sp>
-      <p:sp>
-        <p:nvSpPr>
-          <p:cNvPr id="5" name="Rectangle 4">
-            <a:extLst>
-              <a:ext uri="{FF2B5EF4-FFF2-40B4-BE49-F238E27FC236}">
-                <a16:creationId xmlns:a16="http://schemas.microsoft.com/office/drawing/2014/main" id="{4DC4A37B-BA3B-5AB5-9A76-C7F71BE678D7}"/>
-              </a:ext>
-            </a:extLst>
-          </p:cNvPr>
-          <p:cNvSpPr/>
-          <p:nvPr/>
-        </p:nvSpPr>
-        <p:spPr>
-          <a:xfrm>
-            <a:off x="16825191" y="2832100"/>
-            <a:ext cx="6502400" cy="4546600"/>
-          </a:xfrm>
-          <a:prstGeom prst="rect">
-            <a:avLst/>
-          </a:prstGeom>
-        </p:spPr>
-        <p:style>
-          <a:lnRef idx="3">
-            <a:schemeClr val="lt1"/>
-          </a:lnRef>
-          <a:fillRef idx="1">
-            <a:schemeClr val="accent3"/>
-          </a:fillRef>
-          <a:effectRef idx="1">
-            <a:schemeClr val="accent3"/>
-          </a:effectRef>
-          <a:fontRef idx="minor">
-            <a:schemeClr val="lt1"/>
-          </a:fontRef>
-        </p:style>
-        <p:txBody>
-          <a:bodyPr rtlCol="0" anchor="ctr"/>
-          <a:lstStyle/>
-          <a:p>
-            <a:pPr algn="ctr"/>
-            <a:endParaRPr lang="en-US"/>
-          </a:p>
-        </p:txBody>
-      </p:sp>
-      <p:sp>
-        <p:nvSpPr>
-          <p:cNvPr id="10" name="Rectangle 9">
-            <a:extLst>
-              <a:ext uri="{FF2B5EF4-FFF2-40B4-BE49-F238E27FC236}">
-                <a16:creationId xmlns:a16="http://schemas.microsoft.com/office/drawing/2014/main" id="{B2FC299D-E334-677E-362F-8694D7DBA200}"/>
-              </a:ext>
-            </a:extLst>
-          </p:cNvPr>
-          <p:cNvSpPr/>
-          <p:nvPr/>
-        </p:nvSpPr>
-        <p:spPr>
-          <a:xfrm>
-            <a:off x="9619673" y="7753235"/>
-            <a:ext cx="6502400" cy="4546600"/>
-          </a:xfrm>
-          <a:prstGeom prst="rect">
-            <a:avLst/>
-          </a:prstGeom>
-        </p:spPr>
-        <p:style>
-          <a:lnRef idx="3">
-            <a:schemeClr val="lt1"/>
-          </a:lnRef>
-          <a:fillRef idx="1">
-            <a:schemeClr val="accent3"/>
-          </a:fillRef>
-          <a:effectRef idx="1">
-            <a:schemeClr val="accent3"/>
-          </a:effectRef>
-          <a:fontRef idx="minor">
-            <a:schemeClr val="lt1"/>
-          </a:fontRef>
-        </p:style>
-        <p:txBody>
-          <a:bodyPr rtlCol="0" anchor="ctr"/>
-          <a:lstStyle/>
-          <a:p>
-            <a:pPr algn="ctr"/>
-            <a:endParaRPr lang="en-US"/>
-          </a:p>
-        </p:txBody>
-      </p:sp>
-      <p:sp>
-        <p:nvSpPr>
-          <p:cNvPr id="11" name="ZoneTexte 10">
-            <a:extLst>
-              <a:ext uri="{FF2B5EF4-FFF2-40B4-BE49-F238E27FC236}">
-                <a16:creationId xmlns:a16="http://schemas.microsoft.com/office/drawing/2014/main" id="{5E105F3D-7557-63FC-92C2-AB642A59B9F1}"/>
-              </a:ext>
-            </a:extLst>
-          </p:cNvPr>
-          <p:cNvSpPr txBox="1"/>
-          <p:nvPr/>
-        </p:nvSpPr>
-        <p:spPr>
-          <a:xfrm>
-            <a:off x="11557000" y="3454400"/>
-            <a:ext cx="1828800" cy="417037"/>
-          </a:xfrm>
-          <a:prstGeom prst="rect">
-            <a:avLst/>
-          </a:prstGeom>
-          <a:noFill/>
-        </p:spPr>
-        <p:txBody>
-          <a:bodyPr wrap="square" rtlCol="0">
-            <a:spAutoFit/>
-          </a:bodyPr>
-          <a:lstStyle/>
-          <a:p>
-            <a:r>
-              <a:rPr lang="en-US" dirty="0"/>
-              <a:t>KNN</a:t>
-            </a:r>
-          </a:p>
-        </p:txBody>
-      </p:sp>
-      <p:sp>
-        <p:nvSpPr>
-          <p:cNvPr id="12" name="ZoneTexte 11">
-            <a:extLst>
-              <a:ext uri="{FF2B5EF4-FFF2-40B4-BE49-F238E27FC236}">
-                <a16:creationId xmlns:a16="http://schemas.microsoft.com/office/drawing/2014/main" id="{AFF11BA8-FD4A-8F51-63C4-B71AD817606F}"/>
-              </a:ext>
-            </a:extLst>
-          </p:cNvPr>
-          <p:cNvSpPr txBox="1"/>
-          <p:nvPr/>
-        </p:nvSpPr>
-        <p:spPr>
-          <a:xfrm>
-            <a:off x="18745200" y="3677704"/>
-            <a:ext cx="1828800" cy="417037"/>
-          </a:xfrm>
-          <a:prstGeom prst="rect">
-            <a:avLst/>
-          </a:prstGeom>
-          <a:noFill/>
-        </p:spPr>
-        <p:txBody>
-          <a:bodyPr wrap="square" rtlCol="0">
-            <a:spAutoFit/>
-          </a:bodyPr>
-          <a:lstStyle/>
-          <a:p>
-            <a:r>
-              <a:rPr lang="en-US" dirty="0"/>
-              <a:t>LDA/QDA</a:t>
-            </a:r>
-          </a:p>
-        </p:txBody>
-      </p:sp>
-      <p:sp>
-        <p:nvSpPr>
           <p:cNvPr id="13" name="ZoneTexte 12">
             <a:extLst>
               <a:ext uri="{FF2B5EF4-FFF2-40B4-BE49-F238E27FC236}">
@@ -7338,8 +7004,8 @@
         </p:nvSpPr>
         <p:spPr>
           <a:xfrm>
-            <a:off x="12171852" y="9284793"/>
-            <a:ext cx="1828800" cy="741742"/>
+            <a:off x="9500291" y="7062355"/>
+            <a:ext cx="4989501" cy="646331"/>
           </a:xfrm>
           <a:prstGeom prst="rect">
             <a:avLst/>
@@ -7353,150 +7019,84 @@
           <a:lstStyle/>
           <a:p>
             <a:r>
-              <a:rPr lang="en-US" dirty="0"/>
-              <a:t>Summary STAT</a:t>
+              <a:rPr lang="en-US" sz="3600" b="1" dirty="0">
+                <a:solidFill>
+                  <a:schemeClr val="bg1"/>
+                </a:solidFill>
+                <a:latin typeface="Calibri" panose="020F0502020204030204" pitchFamily="34" charset="0"/>
+                <a:cs typeface="Calibri" panose="020F0502020204030204" pitchFamily="34" charset="0"/>
+              </a:rPr>
+              <a:t>Best Models</a:t>
             </a:r>
           </a:p>
         </p:txBody>
       </p:sp>
-      <p:sp>
-        <p:nvSpPr>
-          <p:cNvPr id="16" name="Rectangle 15">
+      <p:pic>
+        <p:nvPicPr>
+          <p:cNvPr id="35" name="Image 34" descr="Une image contenant graphique&#10;&#10;Description générée automatiquement">
             <a:extLst>
               <a:ext uri="{FF2B5EF4-FFF2-40B4-BE49-F238E27FC236}">
-                <a16:creationId xmlns:a16="http://schemas.microsoft.com/office/drawing/2014/main" id="{EFB3EEE5-75CE-BB9E-36C8-CA2639CC63C8}"/>
+                <a16:creationId xmlns:a16="http://schemas.microsoft.com/office/drawing/2014/main" id="{1275142C-C17A-CF38-CAA2-8D683207A7BA}"/>
               </a:ext>
             </a:extLst>
           </p:cNvPr>
-          <p:cNvSpPr/>
+          <p:cNvPicPr>
+            <a:picLocks noChangeAspect="1"/>
+          </p:cNvPicPr>
           <p:nvPr/>
-        </p:nvSpPr>
+        </p:nvPicPr>
+        <p:blipFill>
+          <a:blip r:embed="rId7"/>
+          <a:stretch>
+            <a:fillRect/>
+          </a:stretch>
+        </p:blipFill>
         <p:spPr>
           <a:xfrm>
-            <a:off x="16825191" y="12765809"/>
-            <a:ext cx="6502400" cy="4546600"/>
+            <a:off x="17505758" y="2042374"/>
+            <a:ext cx="5847880" cy="4235668"/>
           </a:xfrm>
           <a:prstGeom prst="rect">
             <a:avLst/>
           </a:prstGeom>
         </p:spPr>
-        <p:style>
-          <a:lnRef idx="3">
-            <a:schemeClr val="lt1"/>
-          </a:lnRef>
-          <a:fillRef idx="1">
-            <a:schemeClr val="accent3"/>
-          </a:fillRef>
-          <a:effectRef idx="1">
-            <a:schemeClr val="accent3"/>
-          </a:effectRef>
-          <a:fontRef idx="minor">
-            <a:schemeClr val="lt1"/>
-          </a:fontRef>
-        </p:style>
-        <p:txBody>
-          <a:bodyPr rtlCol="0" anchor="ctr"/>
-          <a:lstStyle/>
-          <a:p>
-            <a:pPr algn="ctr"/>
-            <a:endParaRPr lang="en-US"/>
-          </a:p>
-        </p:txBody>
-      </p:sp>
-      <p:sp>
-        <p:nvSpPr>
-          <p:cNvPr id="18" name="Rectangle 17">
+      </p:pic>
+      <p:pic>
+        <p:nvPicPr>
+          <p:cNvPr id="37" name="Image 36" descr="Une image contenant graphique&#10;&#10;Description générée automatiquement">
             <a:extLst>
               <a:ext uri="{FF2B5EF4-FFF2-40B4-BE49-F238E27FC236}">
-                <a16:creationId xmlns:a16="http://schemas.microsoft.com/office/drawing/2014/main" id="{E2DE1FAC-030E-700A-C1F6-2091DF356E5F}"/>
+                <a16:creationId xmlns:a16="http://schemas.microsoft.com/office/drawing/2014/main" id="{DBB5463B-E4A1-DBD4-66FC-3745A1CFB928}"/>
               </a:ext>
             </a:extLst>
           </p:cNvPr>
-          <p:cNvSpPr/>
+          <p:cNvPicPr>
+            <a:picLocks noChangeAspect="1"/>
+          </p:cNvPicPr>
           <p:nvPr/>
-        </p:nvSpPr>
+        </p:nvPicPr>
+        <p:blipFill>
+          <a:blip r:embed="rId8"/>
+          <a:stretch>
+            <a:fillRect/>
+          </a:stretch>
+        </p:blipFill>
         <p:spPr>
           <a:xfrm>
-            <a:off x="16796329" y="7823128"/>
-            <a:ext cx="6502400" cy="4546600"/>
+            <a:off x="9232947" y="2697030"/>
+            <a:ext cx="5604278" cy="4050289"/>
           </a:xfrm>
           <a:prstGeom prst="rect">
             <a:avLst/>
           </a:prstGeom>
         </p:spPr>
-        <p:style>
-          <a:lnRef idx="3">
-            <a:schemeClr val="lt1"/>
-          </a:lnRef>
-          <a:fillRef idx="1">
-            <a:schemeClr val="accent3"/>
-          </a:fillRef>
-          <a:effectRef idx="1">
-            <a:schemeClr val="accent3"/>
-          </a:effectRef>
-          <a:fontRef idx="minor">
-            <a:schemeClr val="lt1"/>
-          </a:fontRef>
-        </p:style>
-        <p:txBody>
-          <a:bodyPr rtlCol="0" anchor="ctr"/>
-          <a:lstStyle/>
-          <a:p>
-            <a:pPr algn="ctr"/>
-            <a:endParaRPr lang="en-US"/>
-          </a:p>
-        </p:txBody>
-      </p:sp>
+      </p:pic>
       <p:sp>
         <p:nvSpPr>
-          <p:cNvPr id="19" name="Rectangle 18">
+          <p:cNvPr id="48" name="ZoneTexte 47">
             <a:extLst>
               <a:ext uri="{FF2B5EF4-FFF2-40B4-BE49-F238E27FC236}">
-                <a16:creationId xmlns:a16="http://schemas.microsoft.com/office/drawing/2014/main" id="{6254BD35-87D6-912B-A6B7-12E1BB61FAD4}"/>
-              </a:ext>
-            </a:extLst>
-          </p:cNvPr>
-          <p:cNvSpPr/>
-          <p:nvPr/>
-        </p:nvSpPr>
-        <p:spPr>
-          <a:xfrm>
-            <a:off x="9835052" y="12715327"/>
-            <a:ext cx="6502400" cy="4546600"/>
-          </a:xfrm>
-          <a:prstGeom prst="rect">
-            <a:avLst/>
-          </a:prstGeom>
-        </p:spPr>
-        <p:style>
-          <a:lnRef idx="3">
-            <a:schemeClr val="lt1"/>
-          </a:lnRef>
-          <a:fillRef idx="1">
-            <a:schemeClr val="accent3"/>
-          </a:fillRef>
-          <a:effectRef idx="1">
-            <a:schemeClr val="accent3"/>
-          </a:effectRef>
-          <a:fontRef idx="minor">
-            <a:schemeClr val="lt1"/>
-          </a:fontRef>
-        </p:style>
-        <p:txBody>
-          <a:bodyPr rtlCol="0" anchor="ctr"/>
-          <a:lstStyle/>
-          <a:p>
-            <a:pPr algn="ctr"/>
-            <a:endParaRPr lang="en-US"/>
-          </a:p>
-        </p:txBody>
-      </p:sp>
-      <p:sp>
-        <p:nvSpPr>
-          <p:cNvPr id="14" name="ZoneTexte 13">
-            <a:extLst>
-              <a:ext uri="{FF2B5EF4-FFF2-40B4-BE49-F238E27FC236}">
-                <a16:creationId xmlns:a16="http://schemas.microsoft.com/office/drawing/2014/main" id="{2767528F-93D6-1DD2-BF5F-05984DCE7C33}"/>
+                <a16:creationId xmlns:a16="http://schemas.microsoft.com/office/drawing/2014/main" id="{60243287-6283-BC1D-F525-772B277990A5}"/>
               </a:ext>
             </a:extLst>
           </p:cNvPr>
@@ -7505,8 +7105,8 @@
         </p:nvSpPr>
         <p:spPr>
           <a:xfrm>
-            <a:off x="19161991" y="10096428"/>
-            <a:ext cx="1828800" cy="417037"/>
+            <a:off x="9663792" y="1914085"/>
+            <a:ext cx="4826000" cy="646331"/>
           </a:xfrm>
           <a:prstGeom prst="rect">
             <a:avLst/>
@@ -7520,18 +7120,24 @@
           <a:lstStyle/>
           <a:p>
             <a:r>
-              <a:rPr lang="en-US" dirty="0"/>
-              <a:t>PCR /PLS</a:t>
+              <a:rPr lang="en-US" sz="3600" b="1" dirty="0">
+                <a:solidFill>
+                  <a:schemeClr val="bg1"/>
+                </a:solidFill>
+                <a:latin typeface="Calibri" panose="020F0502020204030204" pitchFamily="34" charset="0"/>
+                <a:cs typeface="Calibri" panose="020F0502020204030204" pitchFamily="34" charset="0"/>
+              </a:rPr>
+              <a:t>Understanding the Data</a:t>
             </a:r>
           </a:p>
         </p:txBody>
       </p:sp>
       <p:sp>
         <p:nvSpPr>
-          <p:cNvPr id="15" name="ZoneTexte 14">
+          <p:cNvPr id="53" name="ZoneTexte 52">
             <a:extLst>
               <a:ext uri="{FF2B5EF4-FFF2-40B4-BE49-F238E27FC236}">
-                <a16:creationId xmlns:a16="http://schemas.microsoft.com/office/drawing/2014/main" id="{7C846733-0986-4AE4-76D8-0979CBEEA773}"/>
+                <a16:creationId xmlns:a16="http://schemas.microsoft.com/office/drawing/2014/main" id="{BC35075D-12F2-159C-20DB-C1B9FB3C5F33}"/>
               </a:ext>
             </a:extLst>
           </p:cNvPr>
@@ -7540,8 +7146,8 @@
         </p:nvSpPr>
         <p:spPr>
           <a:xfrm>
-            <a:off x="12373152" y="14931981"/>
-            <a:ext cx="1828800" cy="417037"/>
+            <a:off x="9165321" y="11208040"/>
+            <a:ext cx="4989501" cy="769441"/>
           </a:xfrm>
           <a:prstGeom prst="rect">
             <a:avLst/>
@@ -7555,18 +7161,24 @@
           <a:lstStyle/>
           <a:p>
             <a:r>
-              <a:rPr lang="en-US" dirty="0"/>
-              <a:t>ECT</a:t>
+              <a:rPr lang="en-US" sz="4400" b="1" dirty="0">
+                <a:solidFill>
+                  <a:schemeClr val="bg1"/>
+                </a:solidFill>
+                <a:latin typeface="Calibri" panose="020F0502020204030204" pitchFamily="34" charset="0"/>
+                <a:cs typeface="Calibri" panose="020F0502020204030204" pitchFamily="34" charset="0"/>
+              </a:rPr>
+              <a:t>Selected Models</a:t>
             </a:r>
           </a:p>
         </p:txBody>
       </p:sp>
       <p:sp>
         <p:nvSpPr>
-          <p:cNvPr id="20" name="ZoneTexte 19">
+          <p:cNvPr id="54" name="ZoneTexte 53">
             <a:extLst>
               <a:ext uri="{FF2B5EF4-FFF2-40B4-BE49-F238E27FC236}">
-                <a16:creationId xmlns:a16="http://schemas.microsoft.com/office/drawing/2014/main" id="{648C650B-8159-8DDE-F21F-CA339AA8982B}"/>
+                <a16:creationId xmlns:a16="http://schemas.microsoft.com/office/drawing/2014/main" id="{66DF19C7-FC4F-AC72-6AED-3DB36805DB7F}"/>
               </a:ext>
             </a:extLst>
           </p:cNvPr>
@@ -7575,8 +7187,8 @@
         </p:nvSpPr>
         <p:spPr>
           <a:xfrm>
-            <a:off x="18885884" y="14830590"/>
-            <a:ext cx="1828800" cy="417037"/>
+            <a:off x="9326525" y="12065725"/>
+            <a:ext cx="4989501" cy="646331"/>
           </a:xfrm>
           <a:prstGeom prst="rect">
             <a:avLst/>
@@ -7590,12 +7202,1306 @@
           <a:lstStyle/>
           <a:p>
             <a:r>
-              <a:rPr lang="en-US" dirty="0"/>
+              <a:rPr lang="en-US" sz="3600" b="1" dirty="0">
+                <a:solidFill>
+                  <a:schemeClr val="bg1"/>
+                </a:solidFill>
+                <a:latin typeface="Calibri" panose="020F0502020204030204" pitchFamily="34" charset="0"/>
+                <a:cs typeface="Calibri" panose="020F0502020204030204" pitchFamily="34" charset="0"/>
+              </a:rPr>
               <a:t>Tree</a:t>
             </a:r>
           </a:p>
         </p:txBody>
       </p:sp>
+      <p:sp>
+        <p:nvSpPr>
+          <p:cNvPr id="55" name="ZoneTexte 54">
+            <a:extLst>
+              <a:ext uri="{FF2B5EF4-FFF2-40B4-BE49-F238E27FC236}">
+                <a16:creationId xmlns:a16="http://schemas.microsoft.com/office/drawing/2014/main" id="{31FB1643-1DB7-C356-13DD-AE30D17F6869}"/>
+              </a:ext>
+            </a:extLst>
+          </p:cNvPr>
+          <p:cNvSpPr txBox="1"/>
+          <p:nvPr/>
+        </p:nvSpPr>
+        <p:spPr>
+          <a:xfrm>
+            <a:off x="13598608" y="15057304"/>
+            <a:ext cx="4989501" cy="646331"/>
+          </a:xfrm>
+          <a:prstGeom prst="rect">
+            <a:avLst/>
+          </a:prstGeom>
+          <a:noFill/>
+        </p:spPr>
+        <p:txBody>
+          <a:bodyPr wrap="square" rtlCol="0">
+            <a:spAutoFit/>
+          </a:bodyPr>
+          <a:lstStyle/>
+          <a:p>
+            <a:r>
+              <a:rPr lang="en-US" sz="3600" b="1" dirty="0">
+                <a:solidFill>
+                  <a:schemeClr val="bg1"/>
+                </a:solidFill>
+                <a:latin typeface="Calibri" panose="020F0502020204030204" pitchFamily="34" charset="0"/>
+                <a:cs typeface="Calibri" panose="020F0502020204030204" pitchFamily="34" charset="0"/>
+              </a:rPr>
+              <a:t>LASSO</a:t>
+            </a:r>
+          </a:p>
+        </p:txBody>
+      </p:sp>
+      <p:grpSp>
+        <p:nvGrpSpPr>
+          <p:cNvPr id="14344" name="Groupe 14343">
+            <a:extLst>
+              <a:ext uri="{FF2B5EF4-FFF2-40B4-BE49-F238E27FC236}">
+                <a16:creationId xmlns:a16="http://schemas.microsoft.com/office/drawing/2014/main" id="{1420D275-4BDF-702B-DA0B-B57A5BA7CE06}"/>
+              </a:ext>
+            </a:extLst>
+          </p:cNvPr>
+          <p:cNvGrpSpPr/>
+          <p:nvPr/>
+        </p:nvGrpSpPr>
+        <p:grpSpPr>
+          <a:xfrm>
+            <a:off x="8997183" y="7774217"/>
+            <a:ext cx="11989434" cy="3283120"/>
+            <a:chOff x="9023105" y="9035460"/>
+            <a:chExt cx="11989434" cy="3283120"/>
+          </a:xfrm>
+        </p:grpSpPr>
+        <p:grpSp>
+          <p:nvGrpSpPr>
+            <p:cNvPr id="63" name="Groupe 62">
+              <a:extLst>
+                <a:ext uri="{FF2B5EF4-FFF2-40B4-BE49-F238E27FC236}">
+                  <a16:creationId xmlns:a16="http://schemas.microsoft.com/office/drawing/2014/main" id="{D0119772-B39C-1EB3-AD19-559054E82966}"/>
+                </a:ext>
+              </a:extLst>
+            </p:cNvPr>
+            <p:cNvGrpSpPr/>
+            <p:nvPr/>
+          </p:nvGrpSpPr>
+          <p:grpSpPr>
+            <a:xfrm>
+              <a:off x="9023105" y="9035460"/>
+              <a:ext cx="7807581" cy="3283119"/>
+              <a:chOff x="9023105" y="9035460"/>
+              <a:chExt cx="7807581" cy="3283119"/>
+            </a:xfrm>
+          </p:grpSpPr>
+          <p:pic>
+            <p:nvPicPr>
+              <p:cNvPr id="50" name="Image 49" descr="Une image contenant texte&#10;&#10;Description générée automatiquement">
+                <a:extLst>
+                  <a:ext uri="{FF2B5EF4-FFF2-40B4-BE49-F238E27FC236}">
+                    <a16:creationId xmlns:a16="http://schemas.microsoft.com/office/drawing/2014/main" id="{776FD922-9B25-F4B3-C2D4-C83447B4504F}"/>
+                  </a:ext>
+                </a:extLst>
+              </p:cNvPr>
+              <p:cNvPicPr>
+                <a:picLocks noChangeAspect="1"/>
+              </p:cNvPicPr>
+              <p:nvPr/>
+            </p:nvPicPr>
+            <p:blipFill>
+              <a:blip r:embed="rId9"/>
+              <a:stretch>
+                <a:fillRect/>
+              </a:stretch>
+            </p:blipFill>
+            <p:spPr>
+              <a:xfrm>
+                <a:off x="9191243" y="9035460"/>
+                <a:ext cx="7639443" cy="3283119"/>
+              </a:xfrm>
+              <a:prstGeom prst="rect">
+                <a:avLst/>
+              </a:prstGeom>
+            </p:spPr>
+          </p:pic>
+          <p:sp>
+            <p:nvSpPr>
+              <p:cNvPr id="62" name="Ellipse 61">
+                <a:extLst>
+                  <a:ext uri="{FF2B5EF4-FFF2-40B4-BE49-F238E27FC236}">
+                    <a16:creationId xmlns:a16="http://schemas.microsoft.com/office/drawing/2014/main" id="{9D5EE29A-619C-ADE6-B5F9-A66DBB95C99D}"/>
+                  </a:ext>
+                </a:extLst>
+              </p:cNvPr>
+              <p:cNvSpPr/>
+              <p:nvPr/>
+            </p:nvSpPr>
+            <p:spPr>
+              <a:xfrm flipV="1">
+                <a:off x="9023105" y="11182664"/>
+                <a:ext cx="6039938" cy="519573"/>
+              </a:xfrm>
+              <a:prstGeom prst="ellipse">
+                <a:avLst/>
+              </a:prstGeom>
+              <a:noFill/>
+              <a:ln w="12700">
+                <a:solidFill>
+                  <a:srgbClr val="FF0000"/>
+                </a:solidFill>
+              </a:ln>
+            </p:spPr>
+            <p:style>
+              <a:lnRef idx="1">
+                <a:schemeClr val="accent1"/>
+              </a:lnRef>
+              <a:fillRef idx="3">
+                <a:schemeClr val="accent1"/>
+              </a:fillRef>
+              <a:effectRef idx="2">
+                <a:schemeClr val="accent1"/>
+              </a:effectRef>
+              <a:fontRef idx="minor">
+                <a:schemeClr val="lt1"/>
+              </a:fontRef>
+            </p:style>
+            <p:txBody>
+              <a:bodyPr rtlCol="0" anchor="ctr"/>
+              <a:lstStyle/>
+              <a:p>
+                <a:pPr algn="ctr"/>
+                <a:endParaRPr lang="en-US"/>
+              </a:p>
+            </p:txBody>
+          </p:sp>
+        </p:grpSp>
+        <p:grpSp>
+          <p:nvGrpSpPr>
+            <p:cNvPr id="61" name="Groupe 60">
+              <a:extLst>
+                <a:ext uri="{FF2B5EF4-FFF2-40B4-BE49-F238E27FC236}">
+                  <a16:creationId xmlns:a16="http://schemas.microsoft.com/office/drawing/2014/main" id="{71EF0313-D4B5-7E83-C3C7-6C69B288644A}"/>
+                </a:ext>
+              </a:extLst>
+            </p:cNvPr>
+            <p:cNvGrpSpPr/>
+            <p:nvPr/>
+          </p:nvGrpSpPr>
+          <p:grpSpPr>
+            <a:xfrm>
+              <a:off x="14804463" y="9035460"/>
+              <a:ext cx="6208076" cy="3283120"/>
+              <a:chOff x="15173818" y="9006639"/>
+              <a:chExt cx="6261973" cy="3333921"/>
+            </a:xfrm>
+          </p:grpSpPr>
+          <p:pic>
+            <p:nvPicPr>
+              <p:cNvPr id="59" name="Image 58" descr="Une image contenant table&#10;&#10;Description générée automatiquement">
+                <a:extLst>
+                  <a:ext uri="{FF2B5EF4-FFF2-40B4-BE49-F238E27FC236}">
+                    <a16:creationId xmlns:a16="http://schemas.microsoft.com/office/drawing/2014/main" id="{21FBD98D-ECDE-B877-FEED-96A52599FD5C}"/>
+                  </a:ext>
+                </a:extLst>
+              </p:cNvPr>
+              <p:cNvPicPr>
+                <a:picLocks noChangeAspect="1"/>
+              </p:cNvPicPr>
+              <p:nvPr/>
+            </p:nvPicPr>
+            <p:blipFill rotWithShape="1">
+              <a:blip r:embed="rId10"/>
+              <a:srcRect r="21811"/>
+              <a:stretch/>
+            </p:blipFill>
+            <p:spPr>
+              <a:xfrm>
+                <a:off x="15343416" y="9006639"/>
+                <a:ext cx="6092375" cy="3333921"/>
+              </a:xfrm>
+              <a:prstGeom prst="rect">
+                <a:avLst/>
+              </a:prstGeom>
+            </p:spPr>
+          </p:pic>
+          <p:sp>
+            <p:nvSpPr>
+              <p:cNvPr id="60" name="Ellipse 59">
+                <a:extLst>
+                  <a:ext uri="{FF2B5EF4-FFF2-40B4-BE49-F238E27FC236}">
+                    <a16:creationId xmlns:a16="http://schemas.microsoft.com/office/drawing/2014/main" id="{604C3546-BA87-FBEA-732E-09914CCA7197}"/>
+                  </a:ext>
+                </a:extLst>
+              </p:cNvPr>
+              <p:cNvSpPr/>
+              <p:nvPr/>
+            </p:nvSpPr>
+            <p:spPr>
+              <a:xfrm flipV="1">
+                <a:off x="15173818" y="10739095"/>
+                <a:ext cx="6092375" cy="527613"/>
+              </a:xfrm>
+              <a:prstGeom prst="ellipse">
+                <a:avLst/>
+              </a:prstGeom>
+              <a:noFill/>
+              <a:ln w="12700">
+                <a:solidFill>
+                  <a:srgbClr val="FF0000"/>
+                </a:solidFill>
+              </a:ln>
+            </p:spPr>
+            <p:style>
+              <a:lnRef idx="1">
+                <a:schemeClr val="accent1"/>
+              </a:lnRef>
+              <a:fillRef idx="3">
+                <a:schemeClr val="accent1"/>
+              </a:fillRef>
+              <a:effectRef idx="2">
+                <a:schemeClr val="accent1"/>
+              </a:effectRef>
+              <a:fontRef idx="minor">
+                <a:schemeClr val="lt1"/>
+              </a:fontRef>
+            </p:style>
+            <p:txBody>
+              <a:bodyPr rtlCol="0" anchor="ctr"/>
+              <a:lstStyle/>
+              <a:p>
+                <a:pPr algn="ctr"/>
+                <a:endParaRPr lang="en-US"/>
+              </a:p>
+            </p:txBody>
+          </p:sp>
+        </p:grpSp>
+      </p:grpSp>
+      <p:graphicFrame>
+        <p:nvGraphicFramePr>
+          <p:cNvPr id="14336" name="Tableau 14336">
+            <a:extLst>
+              <a:ext uri="{FF2B5EF4-FFF2-40B4-BE49-F238E27FC236}">
+                <a16:creationId xmlns:a16="http://schemas.microsoft.com/office/drawing/2014/main" id="{03B793B3-BBE7-8E5D-2F11-2B95FDA38805}"/>
+              </a:ext>
+            </a:extLst>
+          </p:cNvPr>
+          <p:cNvGraphicFramePr>
+            <a:graphicFrameLocks noGrp="1"/>
+          </p:cNvGraphicFramePr>
+          <p:nvPr>
+            <p:extLst>
+              <p:ext uri="{D42A27DB-BD31-4B8C-83A1-F6EECF244321}">
+                <p14:modId xmlns:p14="http://schemas.microsoft.com/office/powerpoint/2010/main" val="3554533758"/>
+              </p:ext>
+            </p:extLst>
+          </p:nvPr>
+        </p:nvGraphicFramePr>
+        <p:xfrm>
+          <a:off x="15291505" y="11152045"/>
+          <a:ext cx="8393291" cy="4057365"/>
+        </p:xfrm>
+        <a:graphic>
+          <a:graphicData uri="http://schemas.openxmlformats.org/drawingml/2006/table">
+            <a:tbl>
+              <a:tblPr firstRow="1" bandRow="1">
+                <a:tableStyleId>{5C22544A-7EE6-4342-B048-85BDC9FD1C3A}</a:tableStyleId>
+              </a:tblPr>
+              <a:tblGrid>
+                <a:gridCol w="2408102">
+                  <a:extLst>
+                    <a:ext uri="{9D8B030D-6E8A-4147-A177-3AD203B41FA5}">
+                      <a16:colId xmlns:a16="http://schemas.microsoft.com/office/drawing/2014/main" val="4260520582"/>
+                    </a:ext>
+                  </a:extLst>
+                </a:gridCol>
+                <a:gridCol w="2408102">
+                  <a:extLst>
+                    <a:ext uri="{9D8B030D-6E8A-4147-A177-3AD203B41FA5}">
+                      <a16:colId xmlns:a16="http://schemas.microsoft.com/office/drawing/2014/main" val="1266624359"/>
+                    </a:ext>
+                  </a:extLst>
+                </a:gridCol>
+                <a:gridCol w="1692622">
+                  <a:extLst>
+                    <a:ext uri="{9D8B030D-6E8A-4147-A177-3AD203B41FA5}">
+                      <a16:colId xmlns:a16="http://schemas.microsoft.com/office/drawing/2014/main" val="3250989672"/>
+                    </a:ext>
+                  </a:extLst>
+                </a:gridCol>
+                <a:gridCol w="1884465">
+                  <a:extLst>
+                    <a:ext uri="{9D8B030D-6E8A-4147-A177-3AD203B41FA5}">
+                      <a16:colId xmlns:a16="http://schemas.microsoft.com/office/drawing/2014/main" val="3034687232"/>
+                    </a:ext>
+                  </a:extLst>
+                </a:gridCol>
+              </a:tblGrid>
+              <a:tr h="702015">
+                <a:tc gridSpan="4">
+                  <a:txBody>
+                    <a:bodyPr/>
+                    <a:lstStyle/>
+                    <a:p>
+                      <a:pPr algn="ctr"/>
+                      <a:r>
+                        <a:rPr lang="en-US" sz="3200" dirty="0">
+                          <a:solidFill>
+                            <a:schemeClr val="tx1"/>
+                          </a:solidFill>
+                        </a:rPr>
+                        <a:t>Classification Table</a:t>
+                      </a:r>
+                    </a:p>
+                  </a:txBody>
+                  <a:tcPr anchor="ctr"/>
+                </a:tc>
+                <a:tc hMerge="1">
+                  <a:txBody>
+                    <a:bodyPr/>
+                    <a:lstStyle/>
+                    <a:p>
+                      <a:endParaRPr lang="en-US" sz="2800" dirty="0">
+                        <a:solidFill>
+                          <a:schemeClr val="tx1"/>
+                        </a:solidFill>
+                      </a:endParaRPr>
+                    </a:p>
+                  </a:txBody>
+                  <a:tcPr/>
+                </a:tc>
+                <a:tc hMerge="1">
+                  <a:txBody>
+                    <a:bodyPr/>
+                    <a:lstStyle/>
+                    <a:p>
+                      <a:endParaRPr lang="en-US" sz="2800" dirty="0">
+                        <a:solidFill>
+                          <a:schemeClr val="tx1"/>
+                        </a:solidFill>
+                      </a:endParaRPr>
+                    </a:p>
+                  </a:txBody>
+                  <a:tcPr/>
+                </a:tc>
+                <a:tc hMerge="1">
+                  <a:txBody>
+                    <a:bodyPr/>
+                    <a:lstStyle/>
+                    <a:p>
+                      <a:endParaRPr lang="en-US" sz="2800" dirty="0">
+                        <a:solidFill>
+                          <a:schemeClr val="tx1"/>
+                        </a:solidFill>
+                      </a:endParaRPr>
+                    </a:p>
+                  </a:txBody>
+                  <a:tcPr/>
+                </a:tc>
+                <a:extLst>
+                  <a:ext uri="{0D108BD9-81ED-4DB2-BD59-A6C34878D82A}">
+                    <a16:rowId xmlns:a16="http://schemas.microsoft.com/office/drawing/2014/main" val="168703881"/>
+                  </a:ext>
+                </a:extLst>
+              </a:tr>
+              <a:tr h="893915">
+                <a:tc>
+                  <a:txBody>
+                    <a:bodyPr/>
+                    <a:lstStyle/>
+                    <a:p>
+                      <a:r>
+                        <a:rPr lang="en-US" sz="2800" dirty="0" err="1">
+                          <a:solidFill>
+                            <a:schemeClr val="tx1"/>
+                          </a:solidFill>
+                        </a:rPr>
+                        <a:t>Yhat</a:t>
+                      </a:r>
+                      <a:endParaRPr lang="en-US" sz="2800" dirty="0">
+                        <a:solidFill>
+                          <a:schemeClr val="tx1"/>
+                        </a:solidFill>
+                      </a:endParaRPr>
+                    </a:p>
+                  </a:txBody>
+                  <a:tcPr/>
+                </a:tc>
+                <a:tc>
+                  <a:txBody>
+                    <a:bodyPr/>
+                    <a:lstStyle/>
+                    <a:p>
+                      <a:r>
+                        <a:rPr lang="en-US" sz="2800" dirty="0">
+                          <a:solidFill>
+                            <a:schemeClr val="tx1"/>
+                          </a:solidFill>
+                        </a:rPr>
+                        <a:t>For-profit, group</a:t>
+                      </a:r>
+                    </a:p>
+                  </a:txBody>
+                  <a:tcPr/>
+                </a:tc>
+                <a:tc>
+                  <a:txBody>
+                    <a:bodyPr/>
+                    <a:lstStyle/>
+                    <a:p>
+                      <a:r>
+                        <a:rPr lang="en-US" sz="2800" dirty="0">
+                          <a:solidFill>
+                            <a:schemeClr val="tx1"/>
+                          </a:solidFill>
+                        </a:rPr>
+                        <a:t>Non-profit</a:t>
+                      </a:r>
+                    </a:p>
+                  </a:txBody>
+                  <a:tcPr/>
+                </a:tc>
+                <a:tc>
+                  <a:txBody>
+                    <a:bodyPr/>
+                    <a:lstStyle/>
+                    <a:p>
+                      <a:r>
+                        <a:rPr lang="en-US" sz="2800" dirty="0">
+                          <a:solidFill>
+                            <a:schemeClr val="tx1"/>
+                          </a:solidFill>
+                        </a:rPr>
+                        <a:t>For-profit, individual</a:t>
+                      </a:r>
+                    </a:p>
+                  </a:txBody>
+                  <a:tcPr/>
+                </a:tc>
+                <a:extLst>
+                  <a:ext uri="{0D108BD9-81ED-4DB2-BD59-A6C34878D82A}">
+                    <a16:rowId xmlns:a16="http://schemas.microsoft.com/office/drawing/2014/main" val="223790888"/>
+                  </a:ext>
+                </a:extLst>
+              </a:tr>
+              <a:tr h="893915">
+                <a:tc>
+                  <a:txBody>
+                    <a:bodyPr/>
+                    <a:lstStyle/>
+                    <a:p>
+                      <a:pPr marL="0" marR="0" lvl="0" indent="0" algn="l" defTabSz="293934" rtl="0" eaLnBrk="1" fontAlgn="auto" latinLnBrk="0" hangingPunct="1">
+                        <a:lnSpc>
+                          <a:spcPct val="100000"/>
+                        </a:lnSpc>
+                        <a:spcBef>
+                          <a:spcPts val="0"/>
+                        </a:spcBef>
+                        <a:spcAft>
+                          <a:spcPts val="0"/>
+                        </a:spcAft>
+                        <a:buClrTx/>
+                        <a:buSzTx/>
+                        <a:buFontTx/>
+                        <a:buNone/>
+                        <a:tabLst/>
+                        <a:defRPr/>
+                      </a:pPr>
+                      <a:r>
+                        <a:rPr lang="en-US" sz="2800" dirty="0">
+                          <a:solidFill>
+                            <a:schemeClr val="tx1"/>
+                          </a:solidFill>
+                        </a:rPr>
+                        <a:t>For-profit, group</a:t>
+                      </a:r>
+                    </a:p>
+                  </a:txBody>
+                  <a:tcPr/>
+                </a:tc>
+                <a:tc>
+                  <a:txBody>
+                    <a:bodyPr/>
+                    <a:lstStyle/>
+                    <a:p>
+                      <a:r>
+                        <a:rPr lang="en-US" sz="2800" dirty="0">
+                          <a:solidFill>
+                            <a:schemeClr val="tx1"/>
+                          </a:solidFill>
+                        </a:rPr>
+                        <a:t>4566</a:t>
+                      </a:r>
+                    </a:p>
+                  </a:txBody>
+                  <a:tcPr/>
+                </a:tc>
+                <a:tc>
+                  <a:txBody>
+                    <a:bodyPr/>
+                    <a:lstStyle/>
+                    <a:p>
+                      <a:r>
+                        <a:rPr lang="en-US" sz="2800" dirty="0">
+                          <a:solidFill>
+                            <a:schemeClr val="tx1"/>
+                          </a:solidFill>
+                        </a:rPr>
+                        <a:t>477</a:t>
+                      </a:r>
+                    </a:p>
+                  </a:txBody>
+                  <a:tcPr/>
+                </a:tc>
+                <a:tc>
+                  <a:txBody>
+                    <a:bodyPr/>
+                    <a:lstStyle/>
+                    <a:p>
+                      <a:r>
+                        <a:rPr lang="en-US" sz="2800" dirty="0">
+                          <a:solidFill>
+                            <a:schemeClr val="tx1"/>
+                          </a:solidFill>
+                        </a:rPr>
+                        <a:t>268</a:t>
+                      </a:r>
+                    </a:p>
+                  </a:txBody>
+                  <a:tcPr/>
+                </a:tc>
+                <a:extLst>
+                  <a:ext uri="{0D108BD9-81ED-4DB2-BD59-A6C34878D82A}">
+                    <a16:rowId xmlns:a16="http://schemas.microsoft.com/office/drawing/2014/main" val="200606714"/>
+                  </a:ext>
+                </a:extLst>
+              </a:tr>
+              <a:tr h="520710">
+                <a:tc>
+                  <a:txBody>
+                    <a:bodyPr/>
+                    <a:lstStyle/>
+                    <a:p>
+                      <a:pPr marL="0" marR="0" lvl="0" indent="0" algn="l" defTabSz="293934" rtl="0" eaLnBrk="1" fontAlgn="auto" latinLnBrk="0" hangingPunct="1">
+                        <a:lnSpc>
+                          <a:spcPct val="100000"/>
+                        </a:lnSpc>
+                        <a:spcBef>
+                          <a:spcPts val="0"/>
+                        </a:spcBef>
+                        <a:spcAft>
+                          <a:spcPts val="0"/>
+                        </a:spcAft>
+                        <a:buClrTx/>
+                        <a:buSzTx/>
+                        <a:buFontTx/>
+                        <a:buNone/>
+                        <a:tabLst/>
+                        <a:defRPr/>
+                      </a:pPr>
+                      <a:r>
+                        <a:rPr lang="en-US" sz="2800" dirty="0">
+                          <a:solidFill>
+                            <a:schemeClr val="tx1"/>
+                          </a:solidFill>
+                        </a:rPr>
+                        <a:t>Non-profit</a:t>
+                      </a:r>
+                    </a:p>
+                  </a:txBody>
+                  <a:tcPr/>
+                </a:tc>
+                <a:tc>
+                  <a:txBody>
+                    <a:bodyPr/>
+                    <a:lstStyle/>
+                    <a:p>
+                      <a:r>
+                        <a:rPr lang="en-US" sz="2800" dirty="0">
+                          <a:solidFill>
+                            <a:schemeClr val="tx1"/>
+                          </a:solidFill>
+                        </a:rPr>
+                        <a:t>527</a:t>
+                      </a:r>
+                    </a:p>
+                  </a:txBody>
+                  <a:tcPr/>
+                </a:tc>
+                <a:tc>
+                  <a:txBody>
+                    <a:bodyPr/>
+                    <a:lstStyle/>
+                    <a:p>
+                      <a:r>
+                        <a:rPr lang="en-US" sz="2800" dirty="0">
+                          <a:solidFill>
+                            <a:schemeClr val="tx1"/>
+                          </a:solidFill>
+                        </a:rPr>
+                        <a:t>903</a:t>
+                      </a:r>
+                    </a:p>
+                  </a:txBody>
+                  <a:tcPr/>
+                </a:tc>
+                <a:tc>
+                  <a:txBody>
+                    <a:bodyPr/>
+                    <a:lstStyle/>
+                    <a:p>
+                      <a:r>
+                        <a:rPr lang="en-US" sz="2800" dirty="0">
+                          <a:solidFill>
+                            <a:schemeClr val="tx1"/>
+                          </a:solidFill>
+                        </a:rPr>
+                        <a:t>27</a:t>
+                      </a:r>
+                    </a:p>
+                  </a:txBody>
+                  <a:tcPr/>
+                </a:tc>
+                <a:extLst>
+                  <a:ext uri="{0D108BD9-81ED-4DB2-BD59-A6C34878D82A}">
+                    <a16:rowId xmlns:a16="http://schemas.microsoft.com/office/drawing/2014/main" val="1615603606"/>
+                  </a:ext>
+                </a:extLst>
+              </a:tr>
+              <a:tr h="893915">
+                <a:tc>
+                  <a:txBody>
+                    <a:bodyPr/>
+                    <a:lstStyle/>
+                    <a:p>
+                      <a:pPr marL="0" marR="0" lvl="0" indent="0" algn="l" defTabSz="293934" rtl="0" eaLnBrk="1" fontAlgn="auto" latinLnBrk="0" hangingPunct="1">
+                        <a:lnSpc>
+                          <a:spcPct val="100000"/>
+                        </a:lnSpc>
+                        <a:spcBef>
+                          <a:spcPts val="0"/>
+                        </a:spcBef>
+                        <a:spcAft>
+                          <a:spcPts val="0"/>
+                        </a:spcAft>
+                        <a:buClrTx/>
+                        <a:buSzTx/>
+                        <a:buFontTx/>
+                        <a:buNone/>
+                        <a:tabLst/>
+                        <a:defRPr/>
+                      </a:pPr>
+                      <a:r>
+                        <a:rPr lang="en-US" sz="2800" dirty="0">
+                          <a:solidFill>
+                            <a:schemeClr val="tx1"/>
+                          </a:solidFill>
+                        </a:rPr>
+                        <a:t>For-profit, individual</a:t>
+                      </a:r>
+                    </a:p>
+                  </a:txBody>
+                  <a:tcPr/>
+                </a:tc>
+                <a:tc>
+                  <a:txBody>
+                    <a:bodyPr/>
+                    <a:lstStyle/>
+                    <a:p>
+                      <a:r>
+                        <a:rPr lang="en-US" sz="2800" dirty="0">
+                          <a:solidFill>
+                            <a:schemeClr val="tx1"/>
+                          </a:solidFill>
+                        </a:rPr>
+                        <a:t>1494</a:t>
+                      </a:r>
+                    </a:p>
+                  </a:txBody>
+                  <a:tcPr/>
+                </a:tc>
+                <a:tc>
+                  <a:txBody>
+                    <a:bodyPr/>
+                    <a:lstStyle/>
+                    <a:p>
+                      <a:r>
+                        <a:rPr lang="en-US" sz="2800" dirty="0">
+                          <a:solidFill>
+                            <a:schemeClr val="tx1"/>
+                          </a:solidFill>
+                        </a:rPr>
+                        <a:t>91</a:t>
+                      </a:r>
+                    </a:p>
+                  </a:txBody>
+                  <a:tcPr/>
+                </a:tc>
+                <a:tc>
+                  <a:txBody>
+                    <a:bodyPr/>
+                    <a:lstStyle/>
+                    <a:p>
+                      <a:r>
+                        <a:rPr lang="en-US" sz="2800" dirty="0">
+                          <a:solidFill>
+                            <a:schemeClr val="tx1"/>
+                          </a:solidFill>
+                        </a:rPr>
+                        <a:t>3486</a:t>
+                      </a:r>
+                    </a:p>
+                  </a:txBody>
+                  <a:tcPr/>
+                </a:tc>
+                <a:extLst>
+                  <a:ext uri="{0D108BD9-81ED-4DB2-BD59-A6C34878D82A}">
+                    <a16:rowId xmlns:a16="http://schemas.microsoft.com/office/drawing/2014/main" val="3678509143"/>
+                  </a:ext>
+                </a:extLst>
+              </a:tr>
+            </a:tbl>
+          </a:graphicData>
+        </a:graphic>
+      </p:graphicFrame>
+      <p:sp>
+        <p:nvSpPr>
+          <p:cNvPr id="14337" name="ZoneTexte 14336">
+            <a:extLst>
+              <a:ext uri="{FF2B5EF4-FFF2-40B4-BE49-F238E27FC236}">
+                <a16:creationId xmlns:a16="http://schemas.microsoft.com/office/drawing/2014/main" id="{A2FC3EF3-40C5-3313-792D-B39967D95B37}"/>
+              </a:ext>
+            </a:extLst>
+          </p:cNvPr>
+          <p:cNvSpPr txBox="1"/>
+          <p:nvPr/>
+        </p:nvSpPr>
+        <p:spPr>
+          <a:xfrm>
+            <a:off x="13631658" y="2555924"/>
+            <a:ext cx="2889325" cy="1631216"/>
+          </a:xfrm>
+          <a:prstGeom prst="rect">
+            <a:avLst/>
+          </a:prstGeom>
+          <a:solidFill>
+            <a:schemeClr val="bg1"/>
+          </a:solidFill>
+        </p:spPr>
+        <p:txBody>
+          <a:bodyPr wrap="square" rtlCol="0">
+            <a:spAutoFit/>
+          </a:bodyPr>
+          <a:lstStyle/>
+          <a:p>
+            <a:pPr marL="342900" indent="-342900">
+              <a:buFont typeface="Arial" panose="020B0604020202020204" pitchFamily="34" charset="0"/>
+              <a:buChar char="•"/>
+            </a:pPr>
+            <a:r>
+              <a:rPr lang="en-US" sz="2400" dirty="0">
+                <a:latin typeface="Calibri" panose="020F0502020204030204" pitchFamily="34" charset="0"/>
+                <a:cs typeface="Calibri" panose="020F0502020204030204" pitchFamily="34" charset="0"/>
+              </a:rPr>
+              <a:t>Most Business fall under For-profit, </a:t>
+            </a:r>
+            <a:r>
+              <a:rPr lang="en-US" sz="2400" dirty="0">
+                <a:solidFill>
+                  <a:schemeClr val="dk1"/>
+                </a:solidFill>
+                <a:latin typeface="Calibri" panose="020F0502020204030204" pitchFamily="34" charset="0"/>
+                <a:ea typeface="+mn-ea"/>
+                <a:cs typeface="Calibri" panose="020F0502020204030204" pitchFamily="34" charset="0"/>
+              </a:rPr>
+              <a:t>particularly</a:t>
+            </a:r>
+            <a:r>
+              <a:rPr lang="en-US" sz="2400" dirty="0">
+                <a:latin typeface="Calibri" panose="020F0502020204030204" pitchFamily="34" charset="0"/>
+                <a:cs typeface="Calibri" panose="020F0502020204030204" pitchFamily="34" charset="0"/>
+              </a:rPr>
+              <a:t> for-profit group</a:t>
+            </a:r>
+          </a:p>
+        </p:txBody>
+      </p:sp>
+      <p:sp>
+        <p:nvSpPr>
+          <p:cNvPr id="14338" name="ZoneTexte 14337">
+            <a:extLst>
+              <a:ext uri="{FF2B5EF4-FFF2-40B4-BE49-F238E27FC236}">
+                <a16:creationId xmlns:a16="http://schemas.microsoft.com/office/drawing/2014/main" id="{7574DD5E-2377-EC39-BDCC-F591BA95C8E9}"/>
+              </a:ext>
+            </a:extLst>
+          </p:cNvPr>
+          <p:cNvSpPr txBox="1"/>
+          <p:nvPr/>
+        </p:nvSpPr>
+        <p:spPr>
+          <a:xfrm>
+            <a:off x="15346727" y="5123363"/>
+            <a:ext cx="2490655" cy="1938992"/>
+          </a:xfrm>
+          <a:prstGeom prst="rect">
+            <a:avLst/>
+          </a:prstGeom>
+          <a:ln>
+            <a:noFill/>
+          </a:ln>
+        </p:spPr>
+        <p:style>
+          <a:lnRef idx="2">
+            <a:schemeClr val="accent6"/>
+          </a:lnRef>
+          <a:fillRef idx="1">
+            <a:schemeClr val="lt1"/>
+          </a:fillRef>
+          <a:effectRef idx="0">
+            <a:schemeClr val="accent6"/>
+          </a:effectRef>
+          <a:fontRef idx="minor">
+            <a:schemeClr val="dk1"/>
+          </a:fontRef>
+        </p:style>
+        <p:txBody>
+          <a:bodyPr wrap="square" rtlCol="0">
+            <a:spAutoFit/>
+          </a:bodyPr>
+          <a:lstStyle/>
+          <a:p>
+            <a:pPr marL="342900" indent="-342900">
+              <a:buFont typeface="Arial" panose="020B0604020202020204" pitchFamily="34" charset="0"/>
+              <a:buChar char="•"/>
+            </a:pPr>
+            <a:r>
+              <a:rPr lang="en-US" sz="2400" dirty="0">
+                <a:latin typeface="Calibri" panose="020F0502020204030204" pitchFamily="34" charset="0"/>
+                <a:cs typeface="Calibri" panose="020F0502020204030204" pitchFamily="34" charset="0"/>
+              </a:rPr>
+              <a:t>Strong right skew</a:t>
+            </a:r>
+          </a:p>
+          <a:p>
+            <a:pPr marL="342900" indent="-342900">
+              <a:buFont typeface="Arial" panose="020B0604020202020204" pitchFamily="34" charset="0"/>
+              <a:buChar char="•"/>
+            </a:pPr>
+            <a:r>
+              <a:rPr lang="en-US" sz="2400" dirty="0">
+                <a:latin typeface="Calibri" panose="020F0502020204030204" pitchFamily="34" charset="0"/>
+                <a:cs typeface="Calibri" panose="020F0502020204030204" pitchFamily="34" charset="0"/>
+              </a:rPr>
+              <a:t>Mostly smaller amounts forgiven</a:t>
+            </a:r>
+          </a:p>
+        </p:txBody>
+      </p:sp>
+      <p:sp>
+        <p:nvSpPr>
+          <p:cNvPr id="14345" name="ZoneTexte 14344">
+            <a:extLst>
+              <a:ext uri="{FF2B5EF4-FFF2-40B4-BE49-F238E27FC236}">
+                <a16:creationId xmlns:a16="http://schemas.microsoft.com/office/drawing/2014/main" id="{C6BEE41E-1DB5-DB74-139A-A6E862003638}"/>
+              </a:ext>
+            </a:extLst>
+          </p:cNvPr>
+          <p:cNvSpPr txBox="1"/>
+          <p:nvPr/>
+        </p:nvSpPr>
+        <p:spPr>
+          <a:xfrm>
+            <a:off x="21339727" y="7950890"/>
+            <a:ext cx="2544223" cy="3014671"/>
+          </a:xfrm>
+          <a:prstGeom prst="rect">
+            <a:avLst/>
+          </a:prstGeom>
+          <a:noFill/>
+        </p:spPr>
+        <p:txBody>
+          <a:bodyPr wrap="square" rtlCol="0">
+            <a:spAutoFit/>
+          </a:bodyPr>
+          <a:lstStyle/>
+          <a:p>
+            <a:r>
+              <a:rPr lang="en-US" dirty="0"/>
+              <a:t>Best models selected by having the lowest of their respective comparison.  LASSO for Regression and Trees for Classification.</a:t>
+            </a:r>
+          </a:p>
+        </p:txBody>
+      </p:sp>
+      <p:sp>
+        <p:nvSpPr>
+          <p:cNvPr id="14348" name="ZoneTexte 14347">
+            <a:extLst>
+              <a:ext uri="{FF2B5EF4-FFF2-40B4-BE49-F238E27FC236}">
+                <a16:creationId xmlns:a16="http://schemas.microsoft.com/office/drawing/2014/main" id="{11E8E3B2-27A9-0A0B-6337-421918AD30D6}"/>
+              </a:ext>
+            </a:extLst>
+          </p:cNvPr>
+          <p:cNvSpPr txBox="1"/>
+          <p:nvPr/>
+        </p:nvSpPr>
+        <p:spPr>
+          <a:xfrm>
+            <a:off x="18224700" y="16185340"/>
+            <a:ext cx="5187558" cy="1391150"/>
+          </a:xfrm>
+          <a:prstGeom prst="rect">
+            <a:avLst/>
+          </a:prstGeom>
+          <a:noFill/>
+        </p:spPr>
+        <p:txBody>
+          <a:bodyPr wrap="square" rtlCol="0">
+            <a:spAutoFit/>
+          </a:bodyPr>
+          <a:lstStyle/>
+          <a:p>
+            <a:r>
+              <a:rPr lang="en-US" dirty="0"/>
+              <a:t>Final Model:</a:t>
+            </a:r>
+          </a:p>
+          <a:p>
+            <a:endParaRPr lang="en-US" dirty="0"/>
+          </a:p>
+          <a:p>
+            <a:endParaRPr lang="en-US" dirty="0"/>
+          </a:p>
+          <a:p>
+            <a:endParaRPr lang="en-US" dirty="0"/>
+          </a:p>
+        </p:txBody>
+      </p:sp>
+      <p:grpSp>
+        <p:nvGrpSpPr>
+          <p:cNvPr id="14350" name="Groupe 14349">
+            <a:extLst>
+              <a:ext uri="{FF2B5EF4-FFF2-40B4-BE49-F238E27FC236}">
+                <a16:creationId xmlns:a16="http://schemas.microsoft.com/office/drawing/2014/main" id="{9B862E33-FD48-3CA0-1350-D63C62897D46}"/>
+              </a:ext>
+            </a:extLst>
+          </p:cNvPr>
+          <p:cNvGrpSpPr/>
+          <p:nvPr/>
+        </p:nvGrpSpPr>
+        <p:grpSpPr>
+          <a:xfrm>
+            <a:off x="11056837" y="15850823"/>
+            <a:ext cx="6445581" cy="4698121"/>
+            <a:chOff x="17138860" y="11741345"/>
+            <a:chExt cx="6445581" cy="4698121"/>
+          </a:xfrm>
+        </p:grpSpPr>
+        <p:pic>
+          <p:nvPicPr>
+            <p:cNvPr id="52" name="Image 51">
+              <a:extLst>
+                <a:ext uri="{FF2B5EF4-FFF2-40B4-BE49-F238E27FC236}">
+                  <a16:creationId xmlns:a16="http://schemas.microsoft.com/office/drawing/2014/main" id="{7705CC1B-FBAA-A7DF-17B3-99732E8F999C}"/>
+                </a:ext>
+              </a:extLst>
+            </p:cNvPr>
+            <p:cNvPicPr>
+              <a:picLocks noChangeAspect="1"/>
+            </p:cNvPicPr>
+            <p:nvPr/>
+          </p:nvPicPr>
+          <p:blipFill>
+            <a:blip r:embed="rId11"/>
+            <a:stretch>
+              <a:fillRect/>
+            </a:stretch>
+          </p:blipFill>
+          <p:spPr>
+            <a:xfrm>
+              <a:off x="17138860" y="12203798"/>
+              <a:ext cx="6445581" cy="4235668"/>
+            </a:xfrm>
+            <a:prstGeom prst="rect">
+              <a:avLst/>
+            </a:prstGeom>
+          </p:spPr>
+        </p:pic>
+        <p:sp>
+          <p:nvSpPr>
+            <p:cNvPr id="14349" name="ZoneTexte 14348">
+              <a:extLst>
+                <a:ext uri="{FF2B5EF4-FFF2-40B4-BE49-F238E27FC236}">
+                  <a16:creationId xmlns:a16="http://schemas.microsoft.com/office/drawing/2014/main" id="{DB98878B-906C-0D0A-0532-07DE380C4432}"/>
+                </a:ext>
+              </a:extLst>
+            </p:cNvPr>
+            <p:cNvSpPr txBox="1"/>
+            <p:nvPr/>
+          </p:nvSpPr>
+          <p:spPr>
+            <a:xfrm>
+              <a:off x="17138861" y="11741345"/>
+              <a:ext cx="6445580" cy="461665"/>
+            </a:xfrm>
+            <a:prstGeom prst="rect">
+              <a:avLst/>
+            </a:prstGeom>
+            <a:solidFill>
+              <a:schemeClr val="bg1"/>
+            </a:solidFill>
+          </p:spPr>
+          <p:txBody>
+            <a:bodyPr wrap="square" rtlCol="0">
+              <a:spAutoFit/>
+            </a:bodyPr>
+            <a:lstStyle/>
+            <a:p>
+              <a:pPr algn="ctr"/>
+              <a:r>
+                <a:rPr lang="en-US" sz="2400" b="1" dirty="0">
+                  <a:latin typeface="Calibri" panose="020F0502020204030204" pitchFamily="34" charset="0"/>
+                  <a:cs typeface="Calibri" panose="020F0502020204030204" pitchFamily="34" charset="0"/>
+                </a:rPr>
+                <a:t>Cross Validation Curve along the </a:t>
+              </a:r>
+              <a:r>
+                <a:rPr lang="el-GR" sz="2400" b="1" dirty="0">
+                  <a:latin typeface="Calibri" panose="020F0502020204030204" pitchFamily="34" charset="0"/>
+                  <a:cs typeface="Calibri" panose="020F0502020204030204" pitchFamily="34" charset="0"/>
+                </a:rPr>
+                <a:t>λ</a:t>
+              </a:r>
+              <a:r>
+                <a:rPr lang="en-US" sz="2400" b="1" dirty="0">
+                  <a:latin typeface="Calibri" panose="020F0502020204030204" pitchFamily="34" charset="0"/>
+                  <a:cs typeface="Calibri" panose="020F0502020204030204" pitchFamily="34" charset="0"/>
+                </a:rPr>
+                <a:t> Sequence</a:t>
+              </a:r>
+            </a:p>
+          </p:txBody>
+        </p:sp>
+      </p:grpSp>
+      <p:sp>
+        <p:nvSpPr>
+          <p:cNvPr id="14351" name="ZoneTexte 14350">
+            <a:extLst>
+              <a:ext uri="{FF2B5EF4-FFF2-40B4-BE49-F238E27FC236}">
+                <a16:creationId xmlns:a16="http://schemas.microsoft.com/office/drawing/2014/main" id="{C32766FF-E742-2C37-8845-6B65902037BF}"/>
+              </a:ext>
+            </a:extLst>
+          </p:cNvPr>
+          <p:cNvSpPr txBox="1"/>
+          <p:nvPr/>
+        </p:nvSpPr>
+        <p:spPr>
+          <a:xfrm>
+            <a:off x="9326525" y="12878023"/>
+            <a:ext cx="5187558" cy="2913105"/>
+          </a:xfrm>
+          <a:prstGeom prst="rect">
+            <a:avLst/>
+          </a:prstGeom>
+          <a:noFill/>
+        </p:spPr>
+        <p:txBody>
+          <a:bodyPr wrap="square" rtlCol="0">
+            <a:spAutoFit/>
+          </a:bodyPr>
+          <a:lstStyle/>
+          <a:p>
+            <a:pPr marL="342900" marR="0" lvl="0" indent="-342900">
+              <a:spcBef>
+                <a:spcPts val="0"/>
+              </a:spcBef>
+              <a:spcAft>
+                <a:spcPts val="0"/>
+              </a:spcAft>
+              <a:buSzPts val="1000"/>
+              <a:buFont typeface="Arial" panose="020B0604020202020204" pitchFamily="34" charset="0"/>
+              <a:buChar char="•"/>
+              <a:tabLst>
+                <a:tab pos="457200" algn="l"/>
+              </a:tabLst>
+            </a:pPr>
+            <a:r>
+              <a:rPr lang="en-US" sz="2400" dirty="0">
+                <a:solidFill>
+                  <a:srgbClr val="000000"/>
+                </a:solidFill>
+                <a:effectLst/>
+                <a:latin typeface="Calibri" panose="020F0502020204030204" pitchFamily="34" charset="0"/>
+                <a:ea typeface="Times New Roman" panose="02020603050405020304" pitchFamily="18" charset="0"/>
+              </a:rPr>
+              <a:t>Tree had 3 nodes which made decisions based on jobs reported and industry</a:t>
+            </a:r>
+            <a:endParaRPr lang="en-US" sz="2400" dirty="0">
+              <a:solidFill>
+                <a:srgbClr val="000000"/>
+              </a:solidFill>
+              <a:effectLst/>
+              <a:latin typeface="Calibri" panose="020F0502020204030204" pitchFamily="34" charset="0"/>
+              <a:ea typeface="DengXian" panose="02010600030101010101" pitchFamily="2" charset="-122"/>
+            </a:endParaRPr>
+          </a:p>
+          <a:p>
+            <a:pPr marL="342900" marR="0" lvl="0" indent="-342900">
+              <a:spcBef>
+                <a:spcPts val="0"/>
+              </a:spcBef>
+              <a:spcAft>
+                <a:spcPts val="0"/>
+              </a:spcAft>
+              <a:buSzPts val="1000"/>
+              <a:buFont typeface="Arial" panose="020B0604020202020204" pitchFamily="34" charset="0"/>
+              <a:buChar char="•"/>
+              <a:tabLst>
+                <a:tab pos="457200" algn="l"/>
+              </a:tabLst>
+            </a:pPr>
+            <a:r>
+              <a:rPr lang="en-US" sz="2400" dirty="0">
+                <a:solidFill>
+                  <a:srgbClr val="000000"/>
+                </a:solidFill>
+                <a:latin typeface="Calibri" panose="020F0502020204030204" pitchFamily="34" charset="0"/>
+                <a:ea typeface="Times New Roman" panose="02020603050405020304" pitchFamily="18" charset="0"/>
+              </a:rPr>
+              <a:t>R</a:t>
+            </a:r>
+            <a:r>
+              <a:rPr lang="en-US" sz="2400" dirty="0">
+                <a:solidFill>
+                  <a:srgbClr val="000000"/>
+                </a:solidFill>
+                <a:effectLst/>
+                <a:latin typeface="Calibri" panose="020F0502020204030204" pitchFamily="34" charset="0"/>
+                <a:ea typeface="Times New Roman" panose="02020603050405020304" pitchFamily="18" charset="0"/>
+              </a:rPr>
+              <a:t>andom first of 500 trees resulted in </a:t>
+            </a:r>
+            <a:r>
+              <a:rPr lang="en-US" sz="2400" dirty="0" err="1">
+                <a:solidFill>
+                  <a:srgbClr val="000000"/>
+                </a:solidFill>
+                <a:effectLst/>
+                <a:latin typeface="Calibri" panose="020F0502020204030204" pitchFamily="34" charset="0"/>
+                <a:ea typeface="Times New Roman" panose="02020603050405020304" pitchFamily="18" charset="0"/>
+              </a:rPr>
+              <a:t>oob</a:t>
+            </a:r>
+            <a:r>
+              <a:rPr lang="en-US" sz="2400" dirty="0">
+                <a:solidFill>
+                  <a:srgbClr val="000000"/>
+                </a:solidFill>
+                <a:effectLst/>
+                <a:latin typeface="Calibri" panose="020F0502020204030204" pitchFamily="34" charset="0"/>
+                <a:ea typeface="Times New Roman" panose="02020603050405020304" pitchFamily="18" charset="0"/>
+              </a:rPr>
+              <a:t> error rate of 24.36%</a:t>
+            </a:r>
+            <a:endParaRPr lang="en-US" sz="2400" dirty="0">
+              <a:solidFill>
+                <a:srgbClr val="000000"/>
+              </a:solidFill>
+              <a:effectLst/>
+              <a:latin typeface="Calibri" panose="020F0502020204030204" pitchFamily="34" charset="0"/>
+              <a:ea typeface="DengXian" panose="02010600030101010101" pitchFamily="2" charset="-122"/>
+            </a:endParaRPr>
+          </a:p>
+          <a:p>
+            <a:endParaRPr lang="en-US" dirty="0"/>
+          </a:p>
+          <a:p>
+            <a:endParaRPr lang="en-US" dirty="0"/>
+          </a:p>
+          <a:p>
+            <a:endParaRPr lang="en-US" dirty="0"/>
+          </a:p>
+        </p:txBody>
+      </p:sp>
+      <p:cxnSp>
+        <p:nvCxnSpPr>
+          <p:cNvPr id="14353" name="Connecteur droit avec flèche 14352">
+            <a:extLst>
+              <a:ext uri="{FF2B5EF4-FFF2-40B4-BE49-F238E27FC236}">
+                <a16:creationId xmlns:a16="http://schemas.microsoft.com/office/drawing/2014/main" id="{AA1B79F0-0C7A-7E8B-50FF-E48740AA7EBE}"/>
+              </a:ext>
+            </a:extLst>
+          </p:cNvPr>
+          <p:cNvCxnSpPr>
+            <a:cxnSpLocks/>
+          </p:cNvCxnSpPr>
+          <p:nvPr/>
+        </p:nvCxnSpPr>
+        <p:spPr>
+          <a:xfrm flipH="1">
+            <a:off x="20650341" y="8360660"/>
+            <a:ext cx="689386" cy="1119615"/>
+          </a:xfrm>
+          <a:prstGeom prst="straightConnector1">
+            <a:avLst/>
+          </a:prstGeom>
+          <a:ln>
+            <a:tailEnd type="triangle"/>
+          </a:ln>
+        </p:spPr>
+        <p:style>
+          <a:lnRef idx="2">
+            <a:schemeClr val="dk1"/>
+          </a:lnRef>
+          <a:fillRef idx="0">
+            <a:schemeClr val="dk1"/>
+          </a:fillRef>
+          <a:effectRef idx="1">
+            <a:schemeClr val="dk1"/>
+          </a:effectRef>
+          <a:fontRef idx="minor">
+            <a:schemeClr val="tx1"/>
+          </a:fontRef>
+        </p:style>
+      </p:cxnSp>
+      <p:cxnSp>
+        <p:nvCxnSpPr>
+          <p:cNvPr id="14355" name="Connecteur droit avec flèche 14354">
+            <a:extLst>
+              <a:ext uri="{FF2B5EF4-FFF2-40B4-BE49-F238E27FC236}">
+                <a16:creationId xmlns:a16="http://schemas.microsoft.com/office/drawing/2014/main" id="{19F92A08-557D-E4DB-EB28-478DCBDB7B62}"/>
+              </a:ext>
+            </a:extLst>
+          </p:cNvPr>
+          <p:cNvCxnSpPr/>
+          <p:nvPr/>
+        </p:nvCxnSpPr>
+        <p:spPr>
+          <a:xfrm flipH="1" flipV="1">
+            <a:off x="14359263" y="10640856"/>
+            <a:ext cx="6980464" cy="331944"/>
+          </a:xfrm>
+          <a:prstGeom prst="straightConnector1">
+            <a:avLst/>
+          </a:prstGeom>
+          <a:ln>
+            <a:tailEnd type="triangle"/>
+          </a:ln>
+        </p:spPr>
+        <p:style>
+          <a:lnRef idx="2">
+            <a:schemeClr val="dk1"/>
+          </a:lnRef>
+          <a:fillRef idx="0">
+            <a:schemeClr val="dk1"/>
+          </a:fillRef>
+          <a:effectRef idx="1">
+            <a:schemeClr val="dk1"/>
+          </a:effectRef>
+          <a:fontRef idx="minor">
+            <a:schemeClr val="tx1"/>
+          </a:fontRef>
+        </p:style>
+      </p:cxnSp>
     </p:spTree>
   </p:cSld>
   <p:clrMapOvr>

</xml_diff>